<commit_message>
fix issue with wrong char in demo slide notes
</commit_message>
<xml_diff>
--- a/docker/02_Docker_Fundamentals.pptx
+++ b/docker/02_Docker_Fundamentals.pptx
@@ -1932,7 +1932,15 @@
           <a:p>
             <a:r>
               <a:rPr lang="en-US" noProof="0" dirty="0"/>
-              <a:t>However, this is a very unlikely scenario. Probably there are more hosts involved or you want to expose your application to the outside. Docker supports network address translation to map a &lt;</a:t>
+              <a:t>However, this is a very unlikely scenario. Probably there are more hosts involved or you want to expose your application to the outside. Docker supports </a:t>
+            </a:r>
+            <a:r>
+              <a:rPr lang="en-US" b="1" noProof="0" dirty="0"/>
+              <a:t>network address translation (NAT)</a:t>
+            </a:r>
+            <a:r>
+              <a:rPr lang="en-US" noProof="0" dirty="0"/>
+              <a:t> to map a &lt;</a:t>
             </a:r>
             <a:r>
               <a:rPr lang="en-US" noProof="0" dirty="0" err="1"/>
@@ -1957,7 +1965,15 @@
           <a:p>
             <a:r>
               <a:rPr lang="en-US" noProof="0" dirty="0"/>
-              <a:t>This feature is called port forwarding and docker knows two flavors of it.</a:t>
+              <a:t>This feature is called </a:t>
+            </a:r>
+            <a:r>
+              <a:rPr lang="en-US" b="1" noProof="0" dirty="0"/>
+              <a:t>port forwarding</a:t>
+            </a:r>
+            <a:r>
+              <a:rPr lang="en-US" noProof="0" dirty="0"/>
+              <a:t> and docker knows two flavors of it.</a:t>
             </a:r>
           </a:p>
           <a:p>
@@ -1966,7 +1982,15 @@
             </a:pPr>
             <a:r>
               <a:rPr lang="en-US" noProof="0" dirty="0"/>
-              <a:t>Map a dedicated host port to a container port – this has to be specified manually. So you have to keep track of all your used ports in order to avoid conflicts. Use the “-p” (lower case) switch and specify host port &amp; container port.</a:t>
+              <a:t>Map a </a:t>
+            </a:r>
+            <a:r>
+              <a:rPr lang="en-US" b="1" noProof="0" dirty="0"/>
+              <a:t>dedicated host port</a:t>
+            </a:r>
+            <a:r>
+              <a:rPr lang="en-US" noProof="0" dirty="0"/>
+              <a:t> to a container port – this has to be specified manually. So you have to keep track of all your used ports in order to avoid conflicts. Use the “-p” (lower case) switch and specify host port &amp; container port.</a:t>
             </a:r>
           </a:p>
           <a:p>
@@ -1975,7 +1999,15 @@
             </a:pPr>
             <a:r>
               <a:rPr lang="en-US" noProof="0" dirty="0"/>
-              <a:t>Map a random port to a container port. Use the “-P” (upper case) switch. Docker detects the ports a container exposes and automatically assigns an unused port. Check with “docker </a:t>
+              <a:t>Map a </a:t>
+            </a:r>
+            <a:r>
+              <a:rPr lang="en-US" b="1" noProof="0" dirty="0"/>
+              <a:t>random port</a:t>
+            </a:r>
+            <a:r>
+              <a:rPr lang="en-US" noProof="0" dirty="0"/>
+              <a:t> to a container port. Use the “-P” (upper case) switch. Docker detects the ports a container exposes and automatically assigns an unused port. Check with “docker </a:t>
             </a:r>
             <a:r>
               <a:rPr lang="en-US" noProof="0" dirty="0" err="1"/>
@@ -2770,7 +2802,59 @@
             </a:pPr>
             <a:r>
               <a:rPr lang="en-US" noProof="0" dirty="0"/>
-              <a:t>How to differentiate between bind mounts and named volumes? When specifying an absolute path, docker assumes a bind mount. When you just give a name (like in a relative path “config”), it will assume a named volume and create a volume “config”.</a:t>
+              <a:t>How to differentiate between bind mounts and named volumes? </a:t>
+            </a:r>
+          </a:p>
+          <a:p>
+            <a:pPr marL="285750" indent="-285750">
+              <a:buFontTx/>
+              <a:buChar char="-"/>
+            </a:pPr>
+            <a:r>
+              <a:rPr lang="en-US" noProof="0" dirty="0"/>
+              <a:t>When specifying an </a:t>
+            </a:r>
+            <a:r>
+              <a:rPr lang="en-US" b="1" noProof="0" dirty="0"/>
+              <a:t>absolute path</a:t>
+            </a:r>
+            <a:r>
+              <a:rPr lang="en-US" noProof="0" dirty="0"/>
+              <a:t>, docker assumes a </a:t>
+            </a:r>
+            <a:r>
+              <a:rPr lang="en-US" b="1" noProof="0" dirty="0"/>
+              <a:t>bind mount</a:t>
+            </a:r>
+            <a:r>
+              <a:rPr lang="en-US" noProof="0" dirty="0"/>
+              <a:t>. </a:t>
+            </a:r>
+          </a:p>
+          <a:p>
+            <a:pPr marL="285750" indent="-285750">
+              <a:buFontTx/>
+              <a:buChar char="-"/>
+            </a:pPr>
+            <a:r>
+              <a:rPr lang="en-US" noProof="0" dirty="0"/>
+              <a:t>When you just give </a:t>
+            </a:r>
+            <a:r>
+              <a:rPr lang="en-US" b="1" noProof="0" dirty="0"/>
+              <a:t>a name</a:t>
+            </a:r>
+            <a:r>
+              <a:rPr lang="en-US" noProof="0" dirty="0"/>
+              <a:t> (like in a relative path “config”), it will assume a </a:t>
+            </a:r>
+            <a:r>
+              <a:rPr lang="en-US" b="1" noProof="0" dirty="0"/>
+              <a:t>named volume</a:t>
+            </a:r>
+            <a:r>
+              <a:rPr lang="en-US" noProof="0" dirty="0"/>
+              <a:t> and create a volume “config”.</a:t>
             </a:r>
           </a:p>
           <a:p>
@@ -2785,13 +2869,8 @@
             </a:pPr>
             <a:r>
               <a:rPr lang="en-US" noProof="0" dirty="0"/>
-              <a:t>Note: Persistent storage is 'provided' by the host. It can be a part of the file system on the host directly but also an </a:t>
-            </a:r>
-            <a:r>
-              <a:rPr lang="en-US" noProof="0"/>
-              <a:t>NFS mount. </a:t>
-            </a:r>
-            <a:endParaRPr lang="en-US" noProof="0" dirty="0"/>
+              <a:t>Note: Persistent storage is 'provided' by the host. It can be a part of the file system on the host directly but also an NFS mount. </a:t>
+            </a:r>
           </a:p>
         </p:txBody>
       </p:sp>
@@ -2901,7 +2980,15 @@
             </a:pPr>
             <a:r>
               <a:rPr lang="en-US" b="0" dirty="0"/>
-              <a:t>Let’s start simple and (bind) mount a directory into a container. Therefore assume you have a toolbox container and you need some environment in there (like a config file or </a:t>
+              <a:t>Let’s start simple and </a:t>
+            </a:r>
+            <a:r>
+              <a:rPr lang="en-US" b="1" dirty="0"/>
+              <a:t>(bind) mount</a:t>
+            </a:r>
+            <a:r>
+              <a:rPr lang="en-US" b="0" dirty="0"/>
+              <a:t> a directory into a container. Therefore assume you have a toolbox container and you need some environment in there (like a config file or </a:t>
             </a:r>
             <a:r>
               <a:rPr lang="en-US" b="0" dirty="0" err="1"/>
@@ -2926,7 +3013,7 @@
             </a:pPr>
             <a:r>
               <a:rPr lang="en-US" b="0" dirty="0"/>
-              <a:t>docker run –it –v /home/vagrant:/</a:t>
+              <a:t>docker run -it -v /home/vagrant:/</a:t>
             </a:r>
             <a:r>
               <a:rPr lang="en-US" b="0" dirty="0" err="1"/>
@@ -2979,7 +3066,7 @@
             </a:pPr>
             <a:r>
               <a:rPr lang="en-US" b="0" dirty="0"/>
-              <a:t>Docker run –it –v /home/vagrant:/</a:t>
+              <a:t>Docker run -it -v /home/vagrant:/</a:t>
             </a:r>
             <a:r>
               <a:rPr lang="en-US" b="0" dirty="0" err="1"/>
@@ -3005,13 +3092,8 @@
             </a:r>
             <a:r>
               <a:rPr lang="en-US" b="0" dirty="0"/>
-              <a:t> is still there </a:t>
-            </a:r>
-            <a:r>
-              <a:rPr lang="en-US" b="0"/>
-              <a:t>but hidden.</a:t>
-            </a:r>
-            <a:endParaRPr lang="en-US" b="0" dirty="0"/>
+              <a:t> is still there but hidden.</a:t>
+            </a:r>
           </a:p>
           <a:p>
             <a:pPr marL="285750" indent="-285750">
@@ -3052,7 +3134,15 @@
             </a:pPr>
             <a:r>
               <a:rPr lang="en-US" b="0" dirty="0"/>
-              <a:t>Let’s move on to docker volumes. When working with a container, you might want to persist some data during runtime. For this example you will use a Jenkins and make it’s home a volume.</a:t>
+              <a:t>Let’s move on to </a:t>
+            </a:r>
+            <a:r>
+              <a:rPr lang="en-US" b="1" dirty="0"/>
+              <a:t>docker volumes</a:t>
+            </a:r>
+            <a:r>
+              <a:rPr lang="en-US" b="0" dirty="0"/>
+              <a:t>. When working with a container, you might want to persist some data during runtime. For this example you will use a Jenkins and make it’s home a volume.</a:t>
             </a:r>
           </a:p>
           <a:p>
@@ -3062,7 +3152,7 @@
             </a:pPr>
             <a:r>
               <a:rPr lang="en-US" b="0" dirty="0"/>
-              <a:t>docker run –d –P –v </a:t>
+              <a:t>docker run -d -P -v </a:t>
             </a:r>
             <a:r>
               <a:rPr lang="en-US" b="0" dirty="0" err="1"/>
@@ -3155,15 +3245,15 @@
             </a:pPr>
             <a:r>
               <a:rPr lang="en-US" b="0" dirty="0"/>
-              <a:t>Create a user root with a simple </a:t>
+              <a:t>Create a user </a:t>
             </a:r>
             <a:r>
               <a:rPr lang="en-US" b="0" dirty="0" err="1"/>
-              <a:t>pwd</a:t>
+              <a:t>e.g</a:t>
             </a:r>
             <a:r>
               <a:rPr lang="en-US" b="0" dirty="0"/>
-              <a:t> and finish the setup.</a:t>
+              <a:t> ‘root’ with a simple password and finish the setup.</a:t>
             </a:r>
           </a:p>
           <a:p>
@@ -29991,7 +30081,7 @@
 </file>
 
 <file path=ppt/slides/slide23.xml><?xml version="1.0" encoding="utf-8"?>
-<p:sld xmlns:a="http://schemas.openxmlformats.org/drawingml/2006/main" xmlns:r="http://schemas.openxmlformats.org/officeDocument/2006/relationships" xmlns:p="http://schemas.openxmlformats.org/presentationml/2006/main">
+<p:sld xmlns:a="http://schemas.openxmlformats.org/drawingml/2006/main" xmlns:r="http://schemas.openxmlformats.org/officeDocument/2006/relationships" xmlns:p="http://schemas.openxmlformats.org/presentationml/2006/main" show="0">
   <p:cSld>
     <p:spTree>
       <p:nvGrpSpPr>
@@ -31714,7 +31804,7 @@
 </file>
 
 <file path=ppt/slides/slide24.xml><?xml version="1.0" encoding="utf-8"?>
-<p:sld xmlns:a="http://schemas.openxmlformats.org/drawingml/2006/main" xmlns:r="http://schemas.openxmlformats.org/officeDocument/2006/relationships" xmlns:p="http://schemas.openxmlformats.org/presentationml/2006/main">
+<p:sld xmlns:a="http://schemas.openxmlformats.org/drawingml/2006/main" xmlns:r="http://schemas.openxmlformats.org/officeDocument/2006/relationships" xmlns:p="http://schemas.openxmlformats.org/presentationml/2006/main" show="0">
   <p:cSld>
     <p:spTree>
       <p:nvGrpSpPr>

</xml_diff>

<commit_message>
Changed Docker volumes slide.
</commit_message>
<xml_diff>
--- a/docker/02_Docker_Fundamentals.pptx
+++ b/docker/02_Docker_Fundamentals.pptx
@@ -5,10 +5,10 @@
     <p:sldMasterId id="2147483733" r:id="rId1"/>
   </p:sldMasterIdLst>
   <p:notesMasterIdLst>
-    <p:notesMasterId r:id="rId32"/>
+    <p:notesMasterId r:id="rId33"/>
   </p:notesMasterIdLst>
   <p:handoutMasterIdLst>
-    <p:handoutMasterId r:id="rId33"/>
+    <p:handoutMasterId r:id="rId34"/>
   </p:handoutMasterIdLst>
   <p:sldIdLst>
     <p:sldId id="454" r:id="rId2"/>
@@ -36,11 +36,12 @@
     <p:sldId id="465" r:id="rId24"/>
     <p:sldId id="471" r:id="rId25"/>
     <p:sldId id="472" r:id="rId26"/>
-    <p:sldId id="466" r:id="rId27"/>
-    <p:sldId id="467" r:id="rId28"/>
-    <p:sldId id="468" r:id="rId29"/>
-    <p:sldId id="469" r:id="rId30"/>
-    <p:sldId id="265" r:id="rId31"/>
+    <p:sldId id="514" r:id="rId27"/>
+    <p:sldId id="466" r:id="rId28"/>
+    <p:sldId id="467" r:id="rId29"/>
+    <p:sldId id="468" r:id="rId30"/>
+    <p:sldId id="469" r:id="rId31"/>
+    <p:sldId id="265" r:id="rId32"/>
   </p:sldIdLst>
   <p:sldSz cx="12195175" cy="6858000"/>
   <p:notesSz cx="6858000" cy="9144000"/>
@@ -3017,7 +3018,7 @@
         <p:spPr/>
         <p:txBody>
           <a:bodyPr>
-            <a:normAutofit fontScale="92500"/>
+            <a:normAutofit fontScale="92500" lnSpcReduction="10000"/>
           </a:bodyPr>
           <a:lstStyle/>
           <a:p>
@@ -3053,13 +3054,84 @@
             </a:r>
             <a:r>
               <a:rPr lang="en-US" noProof="0" dirty="0"/>
-              <a:t>/application/config (assuming the application reads config from there).  </a:t>
+              <a:t>/application/config (assuming the application reads config from there). </a:t>
+            </a:r>
+          </a:p>
+          <a:p>
+            <a:pPr marL="342900" marR="0" lvl="0" indent="-342900" algn="l" defTabSz="1088776" rtl="0" eaLnBrk="1" fontAlgn="auto" latinLnBrk="0" hangingPunct="1">
+              <a:lnSpc>
+                <a:spcPct val="100000"/>
+              </a:lnSpc>
+              <a:spcBef>
+                <a:spcPts val="0"/>
+              </a:spcBef>
+              <a:spcAft>
+                <a:spcPts val="0"/>
+              </a:spcAft>
+              <a:buClrTx/>
+              <a:buSzTx/>
+              <a:buFontTx/>
+              <a:buAutoNum type="arabicParenR"/>
+              <a:tabLst/>
+              <a:defRPr/>
+            </a:pPr>
+            <a:endParaRPr lang="en-US" sz="1400" b="1" dirty="0">
+              <a:highlight>
+                <a:srgbClr val="C0C0C0"/>
+              </a:highlight>
+              <a:latin typeface="Courier New" panose="02070309020205020404" pitchFamily="49" charset="0"/>
+              <a:cs typeface="Courier New" panose="02070309020205020404" pitchFamily="49" charset="0"/>
+            </a:endParaRPr>
+          </a:p>
+          <a:p>
+            <a:pPr marL="0" marR="0" lvl="0" indent="0" algn="l" defTabSz="1088776" rtl="0" eaLnBrk="1" fontAlgn="auto" latinLnBrk="0" hangingPunct="1">
+              <a:lnSpc>
+                <a:spcPct val="100000"/>
+              </a:lnSpc>
+              <a:spcBef>
+                <a:spcPts val="0"/>
+              </a:spcBef>
+              <a:spcAft>
+                <a:spcPts val="0"/>
+              </a:spcAft>
+              <a:buClrTx/>
+              <a:buSzTx/>
+              <a:buFontTx/>
+              <a:buNone/>
+              <a:tabLst/>
+              <a:defRPr/>
+            </a:pPr>
+            <a:r>
+              <a:rPr lang="en-US" sz="1400" b="1" dirty="0">
+                <a:highlight>
+                  <a:srgbClr val="C0C0C0"/>
+                </a:highlight>
+                <a:latin typeface="Courier New" panose="02070309020205020404" pitchFamily="49" charset="0"/>
+                <a:cs typeface="Courier New" panose="02070309020205020404" pitchFamily="49" charset="0"/>
+              </a:rPr>
+              <a:t>	Command:</a:t>
+            </a:r>
+            <a:r>
+              <a:rPr lang="en-US" sz="1400" b="0" dirty="0">
+                <a:highlight>
+                  <a:srgbClr val="C0C0C0"/>
+                </a:highlight>
+                <a:latin typeface="Courier New" panose="02070309020205020404" pitchFamily="49" charset="0"/>
+                <a:cs typeface="Courier New" panose="02070309020205020404" pitchFamily="49" charset="0"/>
+              </a:rPr>
+              <a:t> docker run –v &lt;source path&gt;:&lt;container path&gt; …</a:t>
             </a:r>
           </a:p>
           <a:p>
             <a:pPr marL="342900" indent="-342900">
               <a:buAutoNum type="arabicParenR"/>
             </a:pPr>
+            <a:endParaRPr lang="en-US" noProof="0" dirty="0"/>
+          </a:p>
+          <a:p>
+            <a:pPr marL="342900" indent="-342900">
+              <a:buAutoNum type="arabicParenR"/>
+            </a:pPr>
             <a:r>
               <a:rPr lang="en-US" b="1" noProof="0" dirty="0"/>
               <a:t>Named volumes: </a:t>
@@ -3067,6 +3139,49 @@
             <a:r>
               <a:rPr lang="en-US" noProof="0" dirty="0"/>
               <a:t>docker can create a separated storage volume. Its lifecycle is independent from the container but still managed by docker. Upon creation, the content of the mount target is merged into the volume. </a:t>
+            </a:r>
+          </a:p>
+          <a:p>
+            <a:pPr marL="342900" indent="-342900">
+              <a:buAutoNum type="arabicParenR"/>
+            </a:pPr>
+            <a:endParaRPr lang="en-US" noProof="0" dirty="0"/>
+          </a:p>
+          <a:p>
+            <a:pPr marL="0" marR="0" lvl="0" indent="0" algn="l" defTabSz="1088776" rtl="0" eaLnBrk="1" fontAlgn="auto" latinLnBrk="0" hangingPunct="1">
+              <a:lnSpc>
+                <a:spcPct val="100000"/>
+              </a:lnSpc>
+              <a:spcBef>
+                <a:spcPts val="0"/>
+              </a:spcBef>
+              <a:spcAft>
+                <a:spcPts val="0"/>
+              </a:spcAft>
+              <a:buClrTx/>
+              <a:buSzTx/>
+              <a:buFontTx/>
+              <a:buNone/>
+              <a:tabLst/>
+              <a:defRPr/>
+            </a:pPr>
+            <a:r>
+              <a:rPr lang="en-US" b="1" noProof="0" dirty="0"/>
+              <a:t>	Command:</a:t>
+            </a:r>
+            <a:r>
+              <a:rPr lang="en-US" b="0" noProof="0" dirty="0"/>
+              <a:t> </a:t>
+            </a:r>
+            <a:r>
+              <a:rPr lang="en-US" sz="1400" b="0" dirty="0">
+                <a:highlight>
+                  <a:srgbClr val="C0C0C0"/>
+                </a:highlight>
+                <a:latin typeface="Courier New" panose="02070309020205020404" pitchFamily="49" charset="0"/>
+                <a:cs typeface="Courier New" panose="02070309020205020404" pitchFamily="49" charset="0"/>
+              </a:rPr>
+              <a:t>docker run –v &lt;vol name&gt;:&lt;container path&gt; …</a:t>
             </a:r>
           </a:p>
           <a:p>
@@ -3232,58 +3347,72 @@
         <p:spPr/>
         <p:txBody>
           <a:bodyPr>
-            <a:normAutofit fontScale="62500" lnSpcReduction="20000"/>
+            <a:normAutofit fontScale="92500"/>
           </a:bodyPr>
           <a:lstStyle/>
           <a:p>
+            <a:r>
+              <a:rPr lang="en-US" noProof="0" dirty="0"/>
+              <a:t>Since it is not recommendable to store data in a docker container, adding a persistence is quite important. With the volumes API it is possible to assign persistent storage to a container. </a:t>
+            </a:r>
+          </a:p>
+          <a:p>
+            <a:endParaRPr lang="en-US" noProof="0" dirty="0"/>
+          </a:p>
+          <a:p>
+            <a:r>
+              <a:rPr lang="en-US" noProof="0" dirty="0"/>
+              <a:t>Docker supports 2 ways of doing so:</a:t>
+            </a:r>
+          </a:p>
+          <a:p>
+            <a:pPr marL="342900" indent="-342900">
+              <a:buAutoNum type="arabicParenR"/>
+            </a:pPr>
+            <a:r>
+              <a:rPr lang="en-US" b="1" noProof="0" dirty="0"/>
+              <a:t>Bind mounts: </a:t>
+            </a:r>
+            <a:r>
+              <a:rPr lang="en-US" noProof="0" dirty="0"/>
+              <a:t>mount a local host directory onto a certain path in the container. Everything that was present before in the target directory is hidden (nature of the bind mount). For example, if you have some configuration you want to inject, write your config file, store it on your docker host at /home/container/config and mount the content of this directory to /</a:t>
+            </a:r>
+            <a:r>
+              <a:rPr lang="en-US" noProof="0" dirty="0" err="1"/>
+              <a:t>usr</a:t>
+            </a:r>
+            <a:r>
+              <a:rPr lang="en-US" noProof="0" dirty="0"/>
+              <a:t>/application/config (assuming the application reads config from there).  </a:t>
+            </a:r>
+          </a:p>
+          <a:p>
+            <a:pPr marL="342900" indent="-342900">
+              <a:buAutoNum type="arabicParenR"/>
+            </a:pPr>
+            <a:r>
+              <a:rPr lang="en-US" b="1" noProof="0" dirty="0"/>
+              <a:t>Named volumes: </a:t>
+            </a:r>
+            <a:r>
+              <a:rPr lang="en-US" noProof="0" dirty="0"/>
+              <a:t>docker can create a separated storage volume. Its lifecycle is independent from the container but still managed by docker. Upon creation, the content of the mount target is merged into the volume. </a:t>
+            </a:r>
+          </a:p>
+          <a:p>
             <a:pPr marL="0" indent="0">
-              <a:buFontTx/>
               <a:buNone/>
             </a:pPr>
-            <a:r>
-              <a:rPr lang="en-US" b="0" dirty="0"/>
-              <a:t>Volumes are the docker way to work with any kind of persistent data.</a:t>
-            </a:r>
+            <a:endParaRPr lang="en-US" noProof="0" dirty="0"/>
           </a:p>
           <a:p>
             <a:pPr marL="0" indent="0">
-              <a:buFontTx/>
               <a:buNone/>
             </a:pPr>
-            <a:endParaRPr lang="en-US" b="0" dirty="0"/>
-          </a:p>
-          <a:p>
-            <a:pPr marL="0" indent="0">
-              <a:buFontTx/>
-              <a:buNone/>
-            </a:pPr>
-            <a:r>
-              <a:rPr lang="en-US" b="0" dirty="0"/>
-              <a:t>Let’s start simple and </a:t>
-            </a:r>
-            <a:r>
-              <a:rPr lang="en-US" b="1" dirty="0"/>
-              <a:t>(bind) mount</a:t>
-            </a:r>
-            <a:r>
-              <a:rPr lang="en-US" b="0" dirty="0"/>
-              <a:t> a directory into a container. Therefore assume you have a toolbox container and you need some environment in there (like a config file or </a:t>
-            </a:r>
-            <a:r>
-              <a:rPr lang="en-US" b="0" dirty="0" err="1"/>
-              <a:t>ssh</a:t>
-            </a:r>
-            <a:r>
-              <a:rPr lang="en-US" b="0" dirty="0"/>
-              <a:t> keys).</a:t>
-            </a:r>
-          </a:p>
-          <a:p>
-            <a:pPr marL="0" indent="0">
-              <a:buFontTx/>
-              <a:buNone/>
-            </a:pPr>
-            <a:endParaRPr lang="en-US" b="0" dirty="0"/>
+            <a:r>
+              <a:rPr lang="en-US" noProof="0" dirty="0"/>
+              <a:t>How to differentiate between bind mounts and named volumes? </a:t>
+            </a:r>
           </a:p>
           <a:p>
             <a:pPr marL="285750" indent="-285750">
@@ -3291,16 +3420,24 @@
               <a:buChar char="-"/>
             </a:pPr>
             <a:r>
-              <a:rPr lang="en-US" b="0" dirty="0"/>
-              <a:t>docker run -it -v /home/vagrant:/</a:t>
-            </a:r>
-            <a:r>
-              <a:rPr lang="en-US" b="0" dirty="0" err="1"/>
-              <a:t>mnt</a:t>
-            </a:r>
-            <a:r>
-              <a:rPr lang="en-US" b="0" dirty="0"/>
-              <a:t>/home alpine:3.8</a:t>
+              <a:rPr lang="en-US" noProof="0" dirty="0"/>
+              <a:t>When specifying an </a:t>
+            </a:r>
+            <a:r>
+              <a:rPr lang="en-US" b="1" noProof="0" dirty="0"/>
+              <a:t>absolute path</a:t>
+            </a:r>
+            <a:r>
+              <a:rPr lang="en-US" noProof="0" dirty="0"/>
+              <a:t>, docker assumes a </a:t>
+            </a:r>
+            <a:r>
+              <a:rPr lang="en-US" b="1" noProof="0" dirty="0"/>
+              <a:t>bind mount</a:t>
+            </a:r>
+            <a:r>
+              <a:rPr lang="en-US" noProof="0" dirty="0"/>
+              <a:t>. </a:t>
             </a:r>
           </a:p>
           <a:p>
@@ -3309,384 +3446,40 @@
               <a:buChar char="-"/>
             </a:pPr>
             <a:r>
-              <a:rPr lang="en-US" b="0" dirty="0"/>
-              <a:t>Show the content of /</a:t>
-            </a:r>
-            <a:r>
-              <a:rPr lang="en-US" b="0" dirty="0" err="1"/>
-              <a:t>mnt</a:t>
-            </a:r>
-            <a:r>
-              <a:rPr lang="en-US" b="0" dirty="0"/>
-              <a:t>/home, which would be you’re home directory</a:t>
-            </a:r>
-          </a:p>
-          <a:p>
-            <a:pPr marL="285750" indent="-285750">
-              <a:buFontTx/>
-              <a:buChar char="-"/>
-            </a:pPr>
-            <a:endParaRPr lang="en-US" b="0" dirty="0"/>
+              <a:rPr lang="en-US" noProof="0" dirty="0"/>
+              <a:t>When you just give </a:t>
+            </a:r>
+            <a:r>
+              <a:rPr lang="en-US" b="1" noProof="0" dirty="0"/>
+              <a:t>a name</a:t>
+            </a:r>
+            <a:r>
+              <a:rPr lang="en-US" noProof="0" dirty="0"/>
+              <a:t> (like in a relative path “config”), it will assume a </a:t>
+            </a:r>
+            <a:r>
+              <a:rPr lang="en-US" b="1" noProof="0" dirty="0"/>
+              <a:t>named volume</a:t>
+            </a:r>
+            <a:r>
+              <a:rPr lang="en-US" noProof="0" dirty="0"/>
+              <a:t> and create a volume “config”.</a:t>
+            </a:r>
           </a:p>
           <a:p>
             <a:pPr marL="0" indent="0">
-              <a:buFontTx/>
               <a:buNone/>
             </a:pPr>
-            <a:r>
-              <a:rPr lang="en-US" b="0" dirty="0"/>
-              <a:t>Let’s see what else you could do with a bind mount:</a:t>
-            </a:r>
-          </a:p>
-          <a:p>
-            <a:pPr marL="285750" indent="-285750">
-              <a:buFontTx/>
-              <a:buChar char="-"/>
-            </a:pPr>
-            <a:r>
-              <a:rPr lang="en-US" b="0" dirty="0"/>
-              <a:t>Docker run -it -v /home/vagrant:/</a:t>
-            </a:r>
-            <a:r>
-              <a:rPr lang="en-US" b="0" dirty="0" err="1"/>
-              <a:t>etc</a:t>
-            </a:r>
-            <a:r>
-              <a:rPr lang="en-US" b="0" dirty="0"/>
-              <a:t> alpine:3.8</a:t>
-            </a:r>
-          </a:p>
-          <a:p>
-            <a:pPr marL="285750" indent="-285750">
-              <a:buFontTx/>
-              <a:buChar char="-"/>
-            </a:pPr>
-            <a:r>
-              <a:rPr lang="en-US" b="0" dirty="0"/>
-              <a:t>What happens? Well, our home directory is mounted to /etc. The original content of /</a:t>
-            </a:r>
-            <a:r>
-              <a:rPr lang="en-US" b="0" dirty="0" err="1"/>
-              <a:t>etc</a:t>
-            </a:r>
-            <a:r>
-              <a:rPr lang="en-US" b="0" dirty="0"/>
-              <a:t> is still there but hidden.</a:t>
-            </a:r>
-          </a:p>
-          <a:p>
-            <a:pPr marL="285750" indent="-285750">
-              <a:buFontTx/>
-              <a:buChar char="-"/>
-            </a:pPr>
-            <a:endParaRPr lang="en-US" b="0" dirty="0"/>
+            <a:endParaRPr lang="en-US" noProof="0" dirty="0"/>
           </a:p>
           <a:p>
             <a:pPr marL="0" indent="0">
-              <a:buFontTx/>
               <a:buNone/>
             </a:pPr>
             <a:r>
-              <a:rPr lang="en-US" b="0" dirty="0"/>
-              <a:t>Of course you can also inject a </a:t>
-            </a:r>
-            <a:r>
-              <a:rPr lang="en-US" b="0" dirty="0" err="1"/>
-              <a:t>nginx</a:t>
-            </a:r>
-            <a:r>
-              <a:rPr lang="en-US" b="0" dirty="0"/>
-              <a:t> index page or any configuration this way, but that’s part of the exercise ;)</a:t>
-            </a:r>
-          </a:p>
-          <a:p>
-            <a:pPr marL="0" indent="0">
-              <a:buFontTx/>
-              <a:buNone/>
-            </a:pPr>
-            <a:endParaRPr lang="en-US" b="0" dirty="0"/>
-          </a:p>
-          <a:p>
-            <a:pPr marL="0" indent="0">
-              <a:buFontTx/>
-              <a:buNone/>
-            </a:pPr>
-            <a:r>
-              <a:rPr lang="en-US" b="0" dirty="0"/>
-              <a:t>Let’s move on to </a:t>
-            </a:r>
-            <a:r>
-              <a:rPr lang="en-US" b="1" dirty="0"/>
-              <a:t>docker volumes</a:t>
-            </a:r>
-            <a:r>
-              <a:rPr lang="en-US" b="0" dirty="0"/>
-              <a:t>. When working with a container, you might want to persist some data during runtime. For this example you will use a Jenkins and make it’s home a volume.</a:t>
-            </a:r>
-          </a:p>
-          <a:p>
-            <a:pPr marL="285750" indent="-285750">
-              <a:buFontTx/>
-              <a:buChar char="-"/>
-            </a:pPr>
-            <a:r>
-              <a:rPr lang="en-US" b="0" dirty="0"/>
-              <a:t>docker run -d -P -v </a:t>
-            </a:r>
-            <a:r>
-              <a:rPr lang="en-US" b="0" dirty="0" err="1"/>
-              <a:t>jenkins_home</a:t>
-            </a:r>
-            <a:r>
-              <a:rPr lang="en-US" b="0" dirty="0"/>
-              <a:t>:/</a:t>
-            </a:r>
-            <a:r>
-              <a:rPr lang="en-US" b="0" dirty="0" err="1"/>
-              <a:t>var</a:t>
-            </a:r>
-            <a:r>
-              <a:rPr lang="en-US" b="0" dirty="0"/>
-              <a:t>/</a:t>
-            </a:r>
-            <a:r>
-              <a:rPr lang="en-US" b="0" dirty="0" err="1"/>
-              <a:t>jenkins_home</a:t>
-            </a:r>
-            <a:r>
-              <a:rPr lang="en-US" b="0" dirty="0"/>
-              <a:t> </a:t>
-            </a:r>
-            <a:r>
-              <a:rPr lang="en-US" b="0" dirty="0" err="1"/>
-              <a:t>jenkins</a:t>
-            </a:r>
-            <a:r>
-              <a:rPr lang="en-US" b="0" dirty="0"/>
-              <a:t>/</a:t>
-            </a:r>
-            <a:r>
-              <a:rPr lang="en-US" b="0" dirty="0" err="1"/>
-              <a:t>jenkins:lts</a:t>
-            </a:r>
-            <a:endParaRPr lang="en-US" b="0" dirty="0"/>
-          </a:p>
-          <a:p>
-            <a:pPr marL="285750" indent="-285750">
-              <a:buFontTx/>
-              <a:buChar char="-"/>
-            </a:pPr>
-            <a:r>
-              <a:rPr lang="en-US" b="0" dirty="0"/>
-              <a:t>Next, get the ports and connect the port that forwards to container port 8080</a:t>
-            </a:r>
-          </a:p>
-          <a:p>
-            <a:pPr marL="285750" indent="-285750">
-              <a:buFontTx/>
-              <a:buChar char="-"/>
-            </a:pPr>
-            <a:r>
-              <a:rPr lang="en-US" b="0" dirty="0"/>
-              <a:t>On the </a:t>
-            </a:r>
-            <a:r>
-              <a:rPr lang="en-US" b="0" dirty="0" err="1"/>
-              <a:t>jenkins</a:t>
-            </a:r>
-            <a:r>
-              <a:rPr lang="en-US" b="0" dirty="0"/>
-              <a:t> logon page, you’re asked for a password, run “docker logs &lt;container name&gt;”  and obtain the logon token</a:t>
-            </a:r>
-          </a:p>
-          <a:p>
-            <a:pPr marL="285750" indent="-285750">
-              <a:buFontTx/>
-              <a:buChar char="-"/>
-            </a:pPr>
-            <a:r>
-              <a:rPr lang="en-US" b="0" dirty="0"/>
-              <a:t>Logon to the </a:t>
-            </a:r>
-            <a:r>
-              <a:rPr lang="en-US" b="0" dirty="0" err="1"/>
-              <a:t>jenkins</a:t>
-            </a:r>
-            <a:r>
-              <a:rPr lang="en-US" b="0" dirty="0"/>
-              <a:t> and choose “select plugins to install”, select “none” (upper left corner) and continue. </a:t>
-            </a:r>
-          </a:p>
-          <a:p>
-            <a:pPr marL="285750" indent="-285750">
-              <a:buFontTx/>
-              <a:buChar char="-"/>
-            </a:pPr>
-            <a:r>
-              <a:rPr lang="en-US" b="0" dirty="0"/>
-              <a:t>Create a user </a:t>
-            </a:r>
-            <a:r>
-              <a:rPr lang="en-US" b="0" dirty="0" err="1"/>
-              <a:t>e.g</a:t>
-            </a:r>
-            <a:r>
-              <a:rPr lang="en-US" b="0" dirty="0"/>
-              <a:t> ‘root’ with a simple password and finish the setup.</a:t>
-            </a:r>
-          </a:p>
-          <a:p>
-            <a:pPr marL="285750" indent="-285750">
-              <a:buFontTx/>
-              <a:buChar char="-"/>
-            </a:pPr>
-            <a:r>
-              <a:rPr lang="en-US" b="0" dirty="0"/>
-              <a:t>Now stop the container and restart it – obviously you’re still able to logon with the credentials created before.</a:t>
-            </a:r>
-          </a:p>
-          <a:p>
-            <a:pPr marL="285750" indent="-285750">
-              <a:buFontTx/>
-              <a:buChar char="-"/>
-            </a:pPr>
-            <a:r>
-              <a:rPr lang="en-US" b="0" dirty="0"/>
-              <a:t>Finally, delete the container and with that also the RW layer and re-execute the docker run </a:t>
-            </a:r>
-            <a:r>
-              <a:rPr lang="en-US" b="0" dirty="0" err="1"/>
-              <a:t>jenkins</a:t>
-            </a:r>
-            <a:r>
-              <a:rPr lang="en-US" b="0" dirty="0"/>
-              <a:t> command. </a:t>
-            </a:r>
-          </a:p>
-          <a:p>
-            <a:pPr marL="285750" indent="-285750">
-              <a:buFontTx/>
-              <a:buChar char="-"/>
-            </a:pPr>
-            <a:r>
-              <a:rPr lang="en-US" b="0" dirty="0"/>
-              <a:t>Connect to your new </a:t>
-            </a:r>
-            <a:r>
-              <a:rPr lang="en-US" b="0" dirty="0" err="1"/>
-              <a:t>jenkins</a:t>
-            </a:r>
-            <a:r>
-              <a:rPr lang="en-US" b="0" dirty="0"/>
-              <a:t> (get the ports before) and logon with the same credentials as you’re still referring to the same </a:t>
-            </a:r>
-            <a:r>
-              <a:rPr lang="en-US" b="0" dirty="0" err="1"/>
-              <a:t>jenkins</a:t>
-            </a:r>
-            <a:r>
-              <a:rPr lang="en-US" b="0" dirty="0"/>
-              <a:t> home.</a:t>
-            </a:r>
-          </a:p>
-          <a:p>
-            <a:pPr marL="285750" indent="-285750">
-              <a:buFontTx/>
-              <a:buChar char="-"/>
-            </a:pPr>
-            <a:r>
-              <a:rPr lang="en-US" b="0" dirty="0"/>
-              <a:t>Inspect the </a:t>
-            </a:r>
-            <a:r>
-              <a:rPr lang="en-US" b="0" dirty="0" err="1"/>
-              <a:t>jenkins_home</a:t>
-            </a:r>
-            <a:r>
-              <a:rPr lang="en-US" b="0" dirty="0"/>
-              <a:t> volume (docker volume inspect </a:t>
-            </a:r>
-            <a:r>
-              <a:rPr lang="en-US" b="0" dirty="0" err="1"/>
-              <a:t>jenkins_home</a:t>
-            </a:r>
-            <a:r>
-              <a:rPr lang="en-US" b="0" dirty="0"/>
-              <a:t>) and go to it’s path (probably you need to be root for that) and show the content.</a:t>
-            </a:r>
-          </a:p>
-          <a:p>
-            <a:pPr marL="285750" indent="-285750">
-              <a:buFontTx/>
-              <a:buChar char="-"/>
-            </a:pPr>
-            <a:endParaRPr lang="en-US" b="0" dirty="0"/>
-          </a:p>
-          <a:p>
-            <a:pPr marL="0" indent="0">
-              <a:buFontTx/>
-              <a:buNone/>
-            </a:pPr>
-            <a:r>
-              <a:rPr lang="en-US" b="0" dirty="0"/>
-              <a:t>Highlight, that the volume upon creation was empty. With the first start of </a:t>
-            </a:r>
-            <a:r>
-              <a:rPr lang="en-US" b="0" dirty="0" err="1"/>
-              <a:t>jenkins</a:t>
-            </a:r>
-            <a:r>
-              <a:rPr lang="en-US" b="0" dirty="0"/>
-              <a:t>, content was written to it. However when launching the 2</a:t>
-            </a:r>
-            <a:r>
-              <a:rPr lang="en-US" b="0" baseline="30000" dirty="0"/>
-              <a:t>nd</a:t>
-            </a:r>
-            <a:r>
-              <a:rPr lang="en-US" b="0" dirty="0"/>
-              <a:t> </a:t>
-            </a:r>
-            <a:r>
-              <a:rPr lang="en-US" b="0" dirty="0" err="1"/>
-              <a:t>jenkins</a:t>
-            </a:r>
-            <a:r>
-              <a:rPr lang="en-US" b="0" dirty="0"/>
-              <a:t> container the content was not overwritten / re-initialized. So if you need to persist some initial data, a named volume might be useful.</a:t>
-            </a:r>
-          </a:p>
-          <a:p>
-            <a:pPr marL="0" indent="0">
-              <a:buFontTx/>
-              <a:buNone/>
-            </a:pPr>
-            <a:endParaRPr lang="en-US" b="0" dirty="0"/>
-          </a:p>
-          <a:p>
-            <a:pPr marL="0" indent="0">
-              <a:buFontTx/>
-              <a:buNone/>
-            </a:pPr>
-            <a:r>
-              <a:rPr lang="en-US" b="0" dirty="0"/>
-              <a:t>Downsides: it’s hard to move a volume to another host, but the k8s storage </a:t>
-            </a:r>
-            <a:r>
-              <a:rPr lang="en-US" b="0" dirty="0" err="1"/>
-              <a:t>api</a:t>
-            </a:r>
-            <a:r>
-              <a:rPr lang="en-US" b="0" dirty="0"/>
-              <a:t> will provide better ways of adding persistence. </a:t>
-            </a:r>
-          </a:p>
-          <a:p>
-            <a:pPr marL="0" indent="0">
-              <a:buFontTx/>
-              <a:buNone/>
-            </a:pPr>
-            <a:endParaRPr lang="en-US" b="0" dirty="0"/>
+              <a:rPr lang="en-US" noProof="0" dirty="0"/>
+              <a:t>Note: Persistent storage is 'provided' by the host. It can be a part of the file system on the host directly but also an NFS mount. </a:t>
+            </a:r>
           </a:p>
         </p:txBody>
       </p:sp>
@@ -3717,7 +3510,7 @@
     </p:spTree>
     <p:extLst>
       <p:ext uri="{BB962C8B-B14F-4D97-AF65-F5344CB8AC3E}">
-        <p14:creationId xmlns:p14="http://schemas.microsoft.com/office/powerpoint/2010/main" val="3606468627"/>
+        <p14:creationId xmlns:p14="http://schemas.microsoft.com/office/powerpoint/2010/main" val="3243662815"/>
       </p:ext>
     </p:extLst>
   </p:cSld>
@@ -3768,10 +3561,462 @@
         </p:nvSpPr>
         <p:spPr/>
         <p:txBody>
-          <a:bodyPr/>
+          <a:bodyPr>
+            <a:normAutofit fontScale="62500" lnSpcReduction="20000"/>
+          </a:bodyPr>
           <a:lstStyle/>
           <a:p>
-            <a:endParaRPr lang="en-US" dirty="0"/>
+            <a:pPr marL="0" indent="0">
+              <a:buFontTx/>
+              <a:buNone/>
+            </a:pPr>
+            <a:r>
+              <a:rPr lang="en-US" b="0" dirty="0"/>
+              <a:t>Volumes are the docker way to work with any kind of persistent data.</a:t>
+            </a:r>
+          </a:p>
+          <a:p>
+            <a:pPr marL="0" indent="0">
+              <a:buFontTx/>
+              <a:buNone/>
+            </a:pPr>
+            <a:endParaRPr lang="en-US" b="0" dirty="0"/>
+          </a:p>
+          <a:p>
+            <a:pPr marL="0" indent="0">
+              <a:buFontTx/>
+              <a:buNone/>
+            </a:pPr>
+            <a:r>
+              <a:rPr lang="en-US" b="0" dirty="0"/>
+              <a:t>Let’s start simple and </a:t>
+            </a:r>
+            <a:r>
+              <a:rPr lang="en-US" b="1" dirty="0"/>
+              <a:t>(bind) mount</a:t>
+            </a:r>
+            <a:r>
+              <a:rPr lang="en-US" b="0" dirty="0"/>
+              <a:t> a directory into a container. Therefore assume you have a toolbox container and you need some environment in there (like a config file or </a:t>
+            </a:r>
+            <a:r>
+              <a:rPr lang="en-US" b="0" dirty="0" err="1"/>
+              <a:t>ssh</a:t>
+            </a:r>
+            <a:r>
+              <a:rPr lang="en-US" b="0" dirty="0"/>
+              <a:t> keys).</a:t>
+            </a:r>
+          </a:p>
+          <a:p>
+            <a:pPr marL="0" indent="0">
+              <a:buFontTx/>
+              <a:buNone/>
+            </a:pPr>
+            <a:endParaRPr lang="en-US" b="0" dirty="0"/>
+          </a:p>
+          <a:p>
+            <a:pPr marL="285750" indent="-285750">
+              <a:buFontTx/>
+              <a:buChar char="-"/>
+            </a:pPr>
+            <a:r>
+              <a:rPr lang="en-US" b="0" dirty="0"/>
+              <a:t>docker run -it -v /home/vagrant:/</a:t>
+            </a:r>
+            <a:r>
+              <a:rPr lang="en-US" b="0" dirty="0" err="1"/>
+              <a:t>mnt</a:t>
+            </a:r>
+            <a:r>
+              <a:rPr lang="en-US" b="0" dirty="0"/>
+              <a:t>/home alpine:3.8</a:t>
+            </a:r>
+          </a:p>
+          <a:p>
+            <a:pPr marL="285750" indent="-285750">
+              <a:buFontTx/>
+              <a:buChar char="-"/>
+            </a:pPr>
+            <a:r>
+              <a:rPr lang="en-US" b="0" dirty="0"/>
+              <a:t>Show the content of /</a:t>
+            </a:r>
+            <a:r>
+              <a:rPr lang="en-US" b="0" dirty="0" err="1"/>
+              <a:t>mnt</a:t>
+            </a:r>
+            <a:r>
+              <a:rPr lang="en-US" b="0" dirty="0"/>
+              <a:t>/home, which would be you’re home directory</a:t>
+            </a:r>
+          </a:p>
+          <a:p>
+            <a:pPr marL="285750" indent="-285750">
+              <a:buFontTx/>
+              <a:buChar char="-"/>
+            </a:pPr>
+            <a:endParaRPr lang="en-US" b="0" dirty="0"/>
+          </a:p>
+          <a:p>
+            <a:pPr marL="0" indent="0">
+              <a:buFontTx/>
+              <a:buNone/>
+            </a:pPr>
+            <a:r>
+              <a:rPr lang="en-US" b="0" dirty="0"/>
+              <a:t>Let’s see what else you could do with a bind mount:</a:t>
+            </a:r>
+          </a:p>
+          <a:p>
+            <a:pPr marL="285750" indent="-285750">
+              <a:buFontTx/>
+              <a:buChar char="-"/>
+            </a:pPr>
+            <a:r>
+              <a:rPr lang="en-US" b="0" dirty="0"/>
+              <a:t>Docker run -it -v /home/vagrant:/</a:t>
+            </a:r>
+            <a:r>
+              <a:rPr lang="en-US" b="0" dirty="0" err="1"/>
+              <a:t>etc</a:t>
+            </a:r>
+            <a:r>
+              <a:rPr lang="en-US" b="0" dirty="0"/>
+              <a:t> alpine:3.8</a:t>
+            </a:r>
+          </a:p>
+          <a:p>
+            <a:pPr marL="285750" indent="-285750">
+              <a:buFontTx/>
+              <a:buChar char="-"/>
+            </a:pPr>
+            <a:r>
+              <a:rPr lang="en-US" b="0" dirty="0"/>
+              <a:t>What happens? Well, our home directory is mounted to /etc. The original content of /</a:t>
+            </a:r>
+            <a:r>
+              <a:rPr lang="en-US" b="0" dirty="0" err="1"/>
+              <a:t>etc</a:t>
+            </a:r>
+            <a:r>
+              <a:rPr lang="en-US" b="0" dirty="0"/>
+              <a:t> is still there but hidden.</a:t>
+            </a:r>
+          </a:p>
+          <a:p>
+            <a:pPr marL="285750" indent="-285750">
+              <a:buFontTx/>
+              <a:buChar char="-"/>
+            </a:pPr>
+            <a:endParaRPr lang="en-US" b="0" dirty="0"/>
+          </a:p>
+          <a:p>
+            <a:pPr marL="0" indent="0">
+              <a:buFontTx/>
+              <a:buNone/>
+            </a:pPr>
+            <a:r>
+              <a:rPr lang="en-US" b="0" dirty="0"/>
+              <a:t>Of course you can also inject a </a:t>
+            </a:r>
+            <a:r>
+              <a:rPr lang="en-US" b="0" dirty="0" err="1"/>
+              <a:t>nginx</a:t>
+            </a:r>
+            <a:r>
+              <a:rPr lang="en-US" b="0" dirty="0"/>
+              <a:t> index page or any configuration this way, but that’s part of the exercise ;)</a:t>
+            </a:r>
+          </a:p>
+          <a:p>
+            <a:pPr marL="0" indent="0">
+              <a:buFontTx/>
+              <a:buNone/>
+            </a:pPr>
+            <a:endParaRPr lang="en-US" b="0" dirty="0"/>
+          </a:p>
+          <a:p>
+            <a:pPr marL="0" indent="0">
+              <a:buFontTx/>
+              <a:buNone/>
+            </a:pPr>
+            <a:r>
+              <a:rPr lang="en-US" b="0" dirty="0"/>
+              <a:t>Let’s move on to </a:t>
+            </a:r>
+            <a:r>
+              <a:rPr lang="en-US" b="1" dirty="0"/>
+              <a:t>docker volumes</a:t>
+            </a:r>
+            <a:r>
+              <a:rPr lang="en-US" b="0" dirty="0"/>
+              <a:t>. When working with a container, you might want to persist some data during runtime. For this example you will use a Jenkins and make it’s home a volume.</a:t>
+            </a:r>
+          </a:p>
+          <a:p>
+            <a:pPr marL="285750" indent="-285750">
+              <a:buFontTx/>
+              <a:buChar char="-"/>
+            </a:pPr>
+            <a:r>
+              <a:rPr lang="en-US" b="0" dirty="0"/>
+              <a:t>docker run -d -P -v </a:t>
+            </a:r>
+            <a:r>
+              <a:rPr lang="en-US" b="0" dirty="0" err="1"/>
+              <a:t>jenkins_home</a:t>
+            </a:r>
+            <a:r>
+              <a:rPr lang="en-US" b="0" dirty="0"/>
+              <a:t>:/</a:t>
+            </a:r>
+            <a:r>
+              <a:rPr lang="en-US" b="0" dirty="0" err="1"/>
+              <a:t>var</a:t>
+            </a:r>
+            <a:r>
+              <a:rPr lang="en-US" b="0" dirty="0"/>
+              <a:t>/</a:t>
+            </a:r>
+            <a:r>
+              <a:rPr lang="en-US" b="0" dirty="0" err="1"/>
+              <a:t>jenkins_home</a:t>
+            </a:r>
+            <a:r>
+              <a:rPr lang="en-US" b="0" dirty="0"/>
+              <a:t> </a:t>
+            </a:r>
+            <a:r>
+              <a:rPr lang="en-US" b="0" dirty="0" err="1"/>
+              <a:t>jenkins</a:t>
+            </a:r>
+            <a:r>
+              <a:rPr lang="en-US" b="0" dirty="0"/>
+              <a:t>/</a:t>
+            </a:r>
+            <a:r>
+              <a:rPr lang="en-US" b="0" dirty="0" err="1"/>
+              <a:t>jenkins:lts</a:t>
+            </a:r>
+            <a:endParaRPr lang="en-US" b="0" dirty="0"/>
+          </a:p>
+          <a:p>
+            <a:pPr marL="285750" indent="-285750">
+              <a:buFontTx/>
+              <a:buChar char="-"/>
+            </a:pPr>
+            <a:r>
+              <a:rPr lang="en-US" b="0" dirty="0"/>
+              <a:t>Next, get the ports and connect the port that forwards to container port 8080</a:t>
+            </a:r>
+          </a:p>
+          <a:p>
+            <a:pPr marL="285750" indent="-285750">
+              <a:buFontTx/>
+              <a:buChar char="-"/>
+            </a:pPr>
+            <a:r>
+              <a:rPr lang="en-US" b="0" dirty="0"/>
+              <a:t>On the </a:t>
+            </a:r>
+            <a:r>
+              <a:rPr lang="en-US" b="0" dirty="0" err="1"/>
+              <a:t>jenkins</a:t>
+            </a:r>
+            <a:r>
+              <a:rPr lang="en-US" b="0" dirty="0"/>
+              <a:t> logon page, you’re asked for a password, run “docker logs &lt;container name&gt;”  and obtain the logon token</a:t>
+            </a:r>
+          </a:p>
+          <a:p>
+            <a:pPr marL="285750" indent="-285750">
+              <a:buFontTx/>
+              <a:buChar char="-"/>
+            </a:pPr>
+            <a:r>
+              <a:rPr lang="en-US" b="0" dirty="0"/>
+              <a:t>Logon to the </a:t>
+            </a:r>
+            <a:r>
+              <a:rPr lang="en-US" b="0" dirty="0" err="1"/>
+              <a:t>jenkins</a:t>
+            </a:r>
+            <a:r>
+              <a:rPr lang="en-US" b="0" dirty="0"/>
+              <a:t> and choose “select plugins to install”, select “none” (upper left corner) and continue. </a:t>
+            </a:r>
+          </a:p>
+          <a:p>
+            <a:pPr marL="285750" indent="-285750">
+              <a:buFontTx/>
+              <a:buChar char="-"/>
+            </a:pPr>
+            <a:r>
+              <a:rPr lang="en-US" b="0" dirty="0"/>
+              <a:t>Create a user </a:t>
+            </a:r>
+            <a:r>
+              <a:rPr lang="en-US" b="0" dirty="0" err="1"/>
+              <a:t>e.g</a:t>
+            </a:r>
+            <a:r>
+              <a:rPr lang="en-US" b="0" dirty="0"/>
+              <a:t> ‘root’ with a simple password and finish the setup.</a:t>
+            </a:r>
+          </a:p>
+          <a:p>
+            <a:pPr marL="285750" indent="-285750">
+              <a:buFontTx/>
+              <a:buChar char="-"/>
+            </a:pPr>
+            <a:r>
+              <a:rPr lang="en-US" b="0" dirty="0"/>
+              <a:t>Now stop the container and restart it – obviously you’re still able to logon with the credentials created before.</a:t>
+            </a:r>
+          </a:p>
+          <a:p>
+            <a:pPr marL="285750" indent="-285750">
+              <a:buFontTx/>
+              <a:buChar char="-"/>
+            </a:pPr>
+            <a:r>
+              <a:rPr lang="en-US" b="0" dirty="0"/>
+              <a:t>Finally, delete the container and with that also the RW layer and re-execute the docker run </a:t>
+            </a:r>
+            <a:r>
+              <a:rPr lang="en-US" b="0" dirty="0" err="1"/>
+              <a:t>jenkins</a:t>
+            </a:r>
+            <a:r>
+              <a:rPr lang="en-US" b="0" dirty="0"/>
+              <a:t> command. </a:t>
+            </a:r>
+          </a:p>
+          <a:p>
+            <a:pPr marL="285750" indent="-285750">
+              <a:buFontTx/>
+              <a:buChar char="-"/>
+            </a:pPr>
+            <a:r>
+              <a:rPr lang="en-US" b="0" dirty="0"/>
+              <a:t>Connect to your new </a:t>
+            </a:r>
+            <a:r>
+              <a:rPr lang="en-US" b="0" dirty="0" err="1"/>
+              <a:t>jenkins</a:t>
+            </a:r>
+            <a:r>
+              <a:rPr lang="en-US" b="0" dirty="0"/>
+              <a:t> (get the ports before) and logon with the same credentials as you’re still referring to the same </a:t>
+            </a:r>
+            <a:r>
+              <a:rPr lang="en-US" b="0" dirty="0" err="1"/>
+              <a:t>jenkins</a:t>
+            </a:r>
+            <a:r>
+              <a:rPr lang="en-US" b="0" dirty="0"/>
+              <a:t> home.</a:t>
+            </a:r>
+          </a:p>
+          <a:p>
+            <a:pPr marL="285750" indent="-285750">
+              <a:buFontTx/>
+              <a:buChar char="-"/>
+            </a:pPr>
+            <a:r>
+              <a:rPr lang="en-US" b="0" dirty="0"/>
+              <a:t>Inspect the </a:t>
+            </a:r>
+            <a:r>
+              <a:rPr lang="en-US" b="0" dirty="0" err="1"/>
+              <a:t>jenkins_home</a:t>
+            </a:r>
+            <a:r>
+              <a:rPr lang="en-US" b="0" dirty="0"/>
+              <a:t> volume (docker volume inspect </a:t>
+            </a:r>
+            <a:r>
+              <a:rPr lang="en-US" b="0" dirty="0" err="1"/>
+              <a:t>jenkins_home</a:t>
+            </a:r>
+            <a:r>
+              <a:rPr lang="en-US" b="0" dirty="0"/>
+              <a:t>) and go to it’s path (probably you need to be root for that) and show the content.</a:t>
+            </a:r>
+          </a:p>
+          <a:p>
+            <a:pPr marL="285750" indent="-285750">
+              <a:buFontTx/>
+              <a:buChar char="-"/>
+            </a:pPr>
+            <a:endParaRPr lang="en-US" b="0" dirty="0"/>
+          </a:p>
+          <a:p>
+            <a:pPr marL="0" indent="0">
+              <a:buFontTx/>
+              <a:buNone/>
+            </a:pPr>
+            <a:r>
+              <a:rPr lang="en-US" b="0" dirty="0"/>
+              <a:t>Highlight, that the volume upon creation was empty. With the first start of </a:t>
+            </a:r>
+            <a:r>
+              <a:rPr lang="en-US" b="0" dirty="0" err="1"/>
+              <a:t>jenkins</a:t>
+            </a:r>
+            <a:r>
+              <a:rPr lang="en-US" b="0" dirty="0"/>
+              <a:t>, content was written to it. However when launching the 2</a:t>
+            </a:r>
+            <a:r>
+              <a:rPr lang="en-US" b="0" baseline="30000" dirty="0"/>
+              <a:t>nd</a:t>
+            </a:r>
+            <a:r>
+              <a:rPr lang="en-US" b="0" dirty="0"/>
+              <a:t> </a:t>
+            </a:r>
+            <a:r>
+              <a:rPr lang="en-US" b="0" dirty="0" err="1"/>
+              <a:t>jenkins</a:t>
+            </a:r>
+            <a:r>
+              <a:rPr lang="en-US" b="0" dirty="0"/>
+              <a:t> container the content was not overwritten / re-initialized. So if you need to persist some initial data, a named volume might be useful.</a:t>
+            </a:r>
+          </a:p>
+          <a:p>
+            <a:pPr marL="0" indent="0">
+              <a:buFontTx/>
+              <a:buNone/>
+            </a:pPr>
+            <a:endParaRPr lang="en-US" b="0" dirty="0"/>
+          </a:p>
+          <a:p>
+            <a:pPr marL="0" indent="0">
+              <a:buFontTx/>
+              <a:buNone/>
+            </a:pPr>
+            <a:r>
+              <a:rPr lang="en-US" b="0" dirty="0"/>
+              <a:t>Downsides: it’s hard to move a volume to another host, but the k8s storage </a:t>
+            </a:r>
+            <a:r>
+              <a:rPr lang="en-US" b="0" dirty="0" err="1"/>
+              <a:t>api</a:t>
+            </a:r>
+            <a:r>
+              <a:rPr lang="en-US" b="0" dirty="0"/>
+              <a:t> will provide better ways of adding persistence. </a:t>
+            </a:r>
+          </a:p>
+          <a:p>
+            <a:pPr marL="0" indent="0">
+              <a:buFontTx/>
+              <a:buNone/>
+            </a:pPr>
+            <a:endParaRPr lang="en-US" b="0" dirty="0"/>
           </a:p>
         </p:txBody>
       </p:sp>
@@ -3802,7 +4047,7 @@
     </p:spTree>
     <p:extLst>
       <p:ext uri="{BB962C8B-B14F-4D97-AF65-F5344CB8AC3E}">
-        <p14:creationId xmlns:p14="http://schemas.microsoft.com/office/powerpoint/2010/main" val="140202979"/>
+        <p14:creationId xmlns:p14="http://schemas.microsoft.com/office/powerpoint/2010/main" val="3606468627"/>
       </p:ext>
     </p:extLst>
   </p:cSld>
@@ -3831,6 +4076,37 @@
       </p:grpSpPr>
       <p:sp>
         <p:nvSpPr>
+          <p:cNvPr id="2" name="Slide Image Placeholder 1"/>
+          <p:cNvSpPr>
+            <a:spLocks noGrp="1" noRot="1" noChangeAspect="1"/>
+          </p:cNvSpPr>
+          <p:nvPr>
+            <p:ph type="sldImg"/>
+          </p:nvPr>
+        </p:nvSpPr>
+        <p:spPr/>
+      </p:sp>
+      <p:sp>
+        <p:nvSpPr>
+          <p:cNvPr id="3" name="Notes Placeholder 2"/>
+          <p:cNvSpPr>
+            <a:spLocks noGrp="1"/>
+          </p:cNvSpPr>
+          <p:nvPr>
+            <p:ph type="body" idx="1"/>
+          </p:nvPr>
+        </p:nvSpPr>
+        <p:spPr/>
+        <p:txBody>
+          <a:bodyPr/>
+          <a:lstStyle/>
+          <a:p>
+            <a:endParaRPr lang="en-US" dirty="0"/>
+          </a:p>
+        </p:txBody>
+      </p:sp>
+      <p:sp>
+        <p:nvSpPr>
           <p:cNvPr id="4" name="Slide Number Placeholder 3"/>
           <p:cNvSpPr>
             <a:spLocks noGrp="1"/>
@@ -3853,48 +4129,10 @@
           </a:p>
         </p:txBody>
       </p:sp>
-      <p:sp>
-        <p:nvSpPr>
-          <p:cNvPr id="6" name="Slide Image Placeholder 5"/>
-          <p:cNvSpPr>
-            <a:spLocks noGrp="1" noRot="1" noChangeAspect="1"/>
-          </p:cNvSpPr>
-          <p:nvPr>
-            <p:ph type="sldImg"/>
-          </p:nvPr>
-        </p:nvSpPr>
-        <p:spPr>
-          <a:xfrm>
-            <a:off x="547688" y="612775"/>
-            <a:ext cx="5762625" cy="3241675"/>
-          </a:xfrm>
-        </p:spPr>
-      </p:sp>
-      <p:sp>
-        <p:nvSpPr>
-          <p:cNvPr id="7" name="Notes Placeholder 6"/>
-          <p:cNvSpPr>
-            <a:spLocks noGrp="1"/>
-          </p:cNvSpPr>
-          <p:nvPr>
-            <p:ph type="body" idx="1"/>
-          </p:nvPr>
-        </p:nvSpPr>
-        <p:spPr/>
-        <p:txBody>
-          <a:bodyPr>
-            <a:normAutofit/>
-          </a:bodyPr>
-          <a:lstStyle/>
-          <a:p>
-            <a:endParaRPr lang="en-US"/>
-          </a:p>
-        </p:txBody>
-      </p:sp>
     </p:spTree>
     <p:extLst>
       <p:ext uri="{BB962C8B-B14F-4D97-AF65-F5344CB8AC3E}">
-        <p14:creationId xmlns:p14="http://schemas.microsoft.com/office/powerpoint/2010/main" val="4089868731"/>
+        <p14:creationId xmlns:p14="http://schemas.microsoft.com/office/powerpoint/2010/main" val="140202979"/>
       </p:ext>
     </p:extLst>
   </p:cSld>
@@ -3937,9 +4175,101 @@
           <a:lstStyle/>
           <a:p>
             <a:fld id="{7D8C2C35-2B8A-446E-BEC0-FD36716C29AC}" type="slidenum">
+              <a:rPr lang="de-DE" smtClean="0"/>
+              <a:pPr/>
+              <a:t>30</a:t>
+            </a:fld>
+            <a:endParaRPr lang="de-DE" dirty="0"/>
+          </a:p>
+        </p:txBody>
+      </p:sp>
+      <p:sp>
+        <p:nvSpPr>
+          <p:cNvPr id="6" name="Slide Image Placeholder 5"/>
+          <p:cNvSpPr>
+            <a:spLocks noGrp="1" noRot="1" noChangeAspect="1"/>
+          </p:cNvSpPr>
+          <p:nvPr>
+            <p:ph type="sldImg"/>
+          </p:nvPr>
+        </p:nvSpPr>
+        <p:spPr>
+          <a:xfrm>
+            <a:off x="547688" y="612775"/>
+            <a:ext cx="5762625" cy="3241675"/>
+          </a:xfrm>
+        </p:spPr>
+      </p:sp>
+      <p:sp>
+        <p:nvSpPr>
+          <p:cNvPr id="7" name="Notes Placeholder 6"/>
+          <p:cNvSpPr>
+            <a:spLocks noGrp="1"/>
+          </p:cNvSpPr>
+          <p:nvPr>
+            <p:ph type="body" idx="1"/>
+          </p:nvPr>
+        </p:nvSpPr>
+        <p:spPr/>
+        <p:txBody>
+          <a:bodyPr>
+            <a:normAutofit/>
+          </a:bodyPr>
+          <a:lstStyle/>
+          <a:p>
+            <a:endParaRPr lang="en-US"/>
+          </a:p>
+        </p:txBody>
+      </p:sp>
+    </p:spTree>
+    <p:extLst>
+      <p:ext uri="{BB962C8B-B14F-4D97-AF65-F5344CB8AC3E}">
+        <p14:creationId xmlns:p14="http://schemas.microsoft.com/office/powerpoint/2010/main" val="4089868731"/>
+      </p:ext>
+    </p:extLst>
+  </p:cSld>
+  <p:clrMapOvr>
+    <a:masterClrMapping/>
+  </p:clrMapOvr>
+</p:notes>
+</file>
+
+<file path=ppt/notesSlides/notesSlide27.xml><?xml version="1.0" encoding="utf-8"?>
+<p:notes xmlns:a="http://schemas.openxmlformats.org/drawingml/2006/main" xmlns:r="http://schemas.openxmlformats.org/officeDocument/2006/relationships" xmlns:p="http://schemas.openxmlformats.org/presentationml/2006/main">
+  <p:cSld>
+    <p:spTree>
+      <p:nvGrpSpPr>
+        <p:cNvPr id="1" name=""/>
+        <p:cNvGrpSpPr/>
+        <p:nvPr/>
+      </p:nvGrpSpPr>
+      <p:grpSpPr>
+        <a:xfrm>
+          <a:off x="0" y="0"/>
+          <a:ext cx="0" cy="0"/>
+          <a:chOff x="0" y="0"/>
+          <a:chExt cx="0" cy="0"/>
+        </a:xfrm>
+      </p:grpSpPr>
+      <p:sp>
+        <p:nvSpPr>
+          <p:cNvPr id="4" name="Slide Number Placeholder 3"/>
+          <p:cNvSpPr>
+            <a:spLocks noGrp="1"/>
+          </p:cNvSpPr>
+          <p:nvPr>
+            <p:ph type="sldNum" sz="quarter" idx="10"/>
+          </p:nvPr>
+        </p:nvSpPr>
+        <p:spPr/>
+        <p:txBody>
+          <a:bodyPr/>
+          <a:lstStyle/>
+          <a:p>
+            <a:fld id="{7D8C2C35-2B8A-446E-BEC0-FD36716C29AC}" type="slidenum">
               <a:rPr lang="en-US" smtClean="0"/>
               <a:pPr/>
-              <a:t>30</a:t>
+              <a:t>31</a:t>
             </a:fld>
             <a:endParaRPr lang="en-US" dirty="0"/>
           </a:p>
@@ -35047,6 +35377,1513 @@
       </p:grpSpPr>
       <p:sp>
         <p:nvSpPr>
+          <p:cNvPr id="6" name="Cube 5">
+            <a:extLst>
+              <a:ext uri="{FF2B5EF4-FFF2-40B4-BE49-F238E27FC236}">
+                <a16:creationId xmlns:a16="http://schemas.microsoft.com/office/drawing/2014/main" id="{7CD00E4C-2CF9-4E13-BF36-3251AC5788D3}"/>
+              </a:ext>
+            </a:extLst>
+          </p:cNvPr>
+          <p:cNvSpPr/>
+          <p:nvPr/>
+        </p:nvSpPr>
+        <p:spPr bwMode="gray">
+          <a:xfrm>
+            <a:off x="504349" y="1323529"/>
+            <a:ext cx="3738599" cy="3519693"/>
+          </a:xfrm>
+          <a:prstGeom prst="cube">
+            <a:avLst>
+              <a:gd name="adj" fmla="val 12493"/>
+            </a:avLst>
+          </a:prstGeom>
+          <a:solidFill>
+            <a:schemeClr val="accent3">
+              <a:lumMod val="50000"/>
+            </a:schemeClr>
+          </a:solidFill>
+          <a:ln w="6350" algn="ctr">
+            <a:noFill/>
+            <a:miter lim="800000"/>
+            <a:headEnd/>
+            <a:tailEnd/>
+          </a:ln>
+        </p:spPr>
+        <p:txBody>
+          <a:bodyPr lIns="90000" tIns="72000" rIns="90000" bIns="72000" rtlCol="0" anchor="t"/>
+          <a:lstStyle/>
+          <a:p>
+            <a:pPr algn="ctr" defTabSz="914400" fontAlgn="base">
+              <a:spcBef>
+                <a:spcPct val="50000"/>
+              </a:spcBef>
+              <a:spcAft>
+                <a:spcPct val="0"/>
+              </a:spcAft>
+              <a:buClr>
+                <a:srgbClr val="F0AB00"/>
+              </a:buClr>
+              <a:buSzPct val="80000"/>
+            </a:pPr>
+            <a:r>
+              <a:rPr lang="en-US" sz="1800" kern="0" dirty="0">
+                <a:solidFill>
+                  <a:schemeClr val="bg1"/>
+                </a:solidFill>
+                <a:ea typeface="Arial Unicode MS" pitchFamily="34" charset="-128"/>
+              </a:rPr>
+              <a:t>Container</a:t>
+            </a:r>
+          </a:p>
+        </p:txBody>
+      </p:sp>
+      <p:sp>
+        <p:nvSpPr>
+          <p:cNvPr id="4" name="Title 3"/>
+          <p:cNvSpPr>
+            <a:spLocks noGrp="1"/>
+          </p:cNvSpPr>
+          <p:nvPr>
+            <p:ph type="title"/>
+          </p:nvPr>
+        </p:nvSpPr>
+        <p:spPr>
+          <a:xfrm>
+            <a:off x="504349" y="515646"/>
+            <a:ext cx="11186476" cy="369332"/>
+          </a:xfrm>
+        </p:spPr>
+        <p:txBody>
+          <a:bodyPr/>
+          <a:lstStyle/>
+          <a:p>
+            <a:r>
+              <a:rPr lang="en-US" dirty="0"/>
+              <a:t>Volumes</a:t>
+            </a:r>
+          </a:p>
+        </p:txBody>
+      </p:sp>
+      <p:sp>
+        <p:nvSpPr>
+          <p:cNvPr id="19" name="Rectangle 18"/>
+          <p:cNvSpPr/>
+          <p:nvPr/>
+        </p:nvSpPr>
+        <p:spPr bwMode="gray">
+          <a:xfrm>
+            <a:off x="5198078" y="1323528"/>
+            <a:ext cx="2399224" cy="3519694"/>
+          </a:xfrm>
+          <a:prstGeom prst="rect">
+            <a:avLst/>
+          </a:prstGeom>
+          <a:solidFill>
+            <a:schemeClr val="bg1">
+              <a:lumMod val="95000"/>
+            </a:schemeClr>
+          </a:solidFill>
+          <a:ln w="6350" algn="ctr">
+            <a:solidFill>
+              <a:schemeClr val="tx1"/>
+            </a:solidFill>
+            <a:miter lim="800000"/>
+            <a:headEnd/>
+            <a:tailEnd/>
+          </a:ln>
+        </p:spPr>
+        <p:txBody>
+          <a:bodyPr lIns="90000" tIns="72000" rIns="90000" bIns="72000" rtlCol="0" anchor="t"/>
+          <a:lstStyle/>
+          <a:p>
+            <a:pPr marR="0" algn="ctr" defTabSz="914400" eaLnBrk="1" fontAlgn="base" latinLnBrk="0" hangingPunct="1">
+              <a:lnSpc>
+                <a:spcPct val="100000"/>
+              </a:lnSpc>
+              <a:spcBef>
+                <a:spcPct val="50000"/>
+              </a:spcBef>
+              <a:spcAft>
+                <a:spcPct val="0"/>
+              </a:spcAft>
+              <a:buClr>
+                <a:srgbClr val="F0AB00"/>
+              </a:buClr>
+              <a:buSzPct val="80000"/>
+              <a:tabLst/>
+            </a:pPr>
+            <a:r>
+              <a:rPr kumimoji="0" lang="de-DE" sz="1800" b="0" i="0" u="none" strike="noStrike" kern="0" cap="none" spc="0" normalizeH="0" baseline="0" noProof="0" dirty="0">
+                <a:ln>
+                  <a:noFill/>
+                </a:ln>
+                <a:effectLst/>
+                <a:uLnTx/>
+                <a:uFillTx/>
+                <a:ea typeface="Arial Unicode MS" pitchFamily="34" charset="-128"/>
+                <a:cs typeface="Arial Unicode MS" pitchFamily="34" charset="-128"/>
+              </a:rPr>
+              <a:t>Local Filesystem</a:t>
+            </a:r>
+          </a:p>
+        </p:txBody>
+      </p:sp>
+      <p:grpSp>
+        <p:nvGrpSpPr>
+          <p:cNvPr id="14" name="Group 13">
+            <a:extLst>
+              <a:ext uri="{FF2B5EF4-FFF2-40B4-BE49-F238E27FC236}">
+                <a16:creationId xmlns:a16="http://schemas.microsoft.com/office/drawing/2014/main" id="{A5219D93-B028-4AFC-9A58-631CA6381F73}"/>
+              </a:ext>
+            </a:extLst>
+          </p:cNvPr>
+          <p:cNvGrpSpPr/>
+          <p:nvPr/>
+        </p:nvGrpSpPr>
+        <p:grpSpPr>
+          <a:xfrm>
+            <a:off x="688057" y="3342671"/>
+            <a:ext cx="2913925" cy="1167723"/>
+            <a:chOff x="508988" y="3121001"/>
+            <a:chExt cx="2913925" cy="1080875"/>
+          </a:xfrm>
+        </p:grpSpPr>
+        <p:sp>
+          <p:nvSpPr>
+            <p:cNvPr id="15" name="Rectangle 14">
+              <a:extLst>
+                <a:ext uri="{FF2B5EF4-FFF2-40B4-BE49-F238E27FC236}">
+                  <a16:creationId xmlns:a16="http://schemas.microsoft.com/office/drawing/2014/main" id="{E1F49C17-01F3-4D35-A58F-265D99D96ECB}"/>
+                </a:ext>
+              </a:extLst>
+            </p:cNvPr>
+            <p:cNvSpPr/>
+            <p:nvPr/>
+          </p:nvSpPr>
+          <p:spPr bwMode="gray">
+            <a:xfrm>
+              <a:off x="508988" y="3121001"/>
+              <a:ext cx="2913925" cy="1080875"/>
+            </a:xfrm>
+            <a:prstGeom prst="rect">
+              <a:avLst/>
+            </a:prstGeom>
+            <a:solidFill>
+              <a:schemeClr val="accent2">
+                <a:lumMod val="20000"/>
+                <a:lumOff val="80000"/>
+              </a:schemeClr>
+            </a:solidFill>
+            <a:ln w="6350" algn="ctr">
+              <a:solidFill>
+                <a:schemeClr val="tx1"/>
+              </a:solidFill>
+              <a:miter lim="800000"/>
+              <a:headEnd/>
+              <a:tailEnd/>
+            </a:ln>
+          </p:spPr>
+          <p:txBody>
+            <a:bodyPr vert="vert270" lIns="90000" tIns="72000" rIns="90000" bIns="72000" rtlCol="0" anchor="t" anchorCtr="0"/>
+            <a:lstStyle/>
+            <a:p>
+              <a:pPr marR="0" algn="ctr" defTabSz="914400" eaLnBrk="1" fontAlgn="base" latinLnBrk="0" hangingPunct="1">
+                <a:lnSpc>
+                  <a:spcPct val="100000"/>
+                </a:lnSpc>
+                <a:spcBef>
+                  <a:spcPct val="50000"/>
+                </a:spcBef>
+                <a:spcAft>
+                  <a:spcPct val="0"/>
+                </a:spcAft>
+                <a:buClr>
+                  <a:srgbClr val="F0AB00"/>
+                </a:buClr>
+                <a:buSzPct val="80000"/>
+                <a:tabLst/>
+              </a:pPr>
+              <a:r>
+                <a:rPr kumimoji="0" lang="en-US" sz="1000" b="0" i="1" u="none" strike="noStrike" kern="0" cap="none" spc="0" normalizeH="0" baseline="0" dirty="0">
+                  <a:ln>
+                    <a:noFill/>
+                  </a:ln>
+                  <a:effectLst/>
+                  <a:uLnTx/>
+                  <a:uFillTx/>
+                  <a:ea typeface="Arial Unicode MS" pitchFamily="34" charset="-128"/>
+                  <a:cs typeface="Arial Unicode MS" pitchFamily="34" charset="-128"/>
+                </a:rPr>
+                <a:t>Image</a:t>
+              </a:r>
+            </a:p>
+          </p:txBody>
+        </p:sp>
+        <p:sp>
+          <p:nvSpPr>
+            <p:cNvPr id="16" name="Rectangle 15">
+              <a:extLst>
+                <a:ext uri="{FF2B5EF4-FFF2-40B4-BE49-F238E27FC236}">
+                  <a16:creationId xmlns:a16="http://schemas.microsoft.com/office/drawing/2014/main" id="{6D0B2E5D-98B0-4EA4-A371-C48D4D9E0746}"/>
+                </a:ext>
+              </a:extLst>
+            </p:cNvPr>
+            <p:cNvSpPr/>
+            <p:nvPr/>
+          </p:nvSpPr>
+          <p:spPr bwMode="gray">
+            <a:xfrm>
+              <a:off x="881430" y="3800405"/>
+              <a:ext cx="2461079" cy="243559"/>
+            </a:xfrm>
+            <a:prstGeom prst="rect">
+              <a:avLst/>
+            </a:prstGeom>
+            <a:solidFill>
+              <a:schemeClr val="accent6">
+                <a:lumMod val="75000"/>
+              </a:schemeClr>
+            </a:solidFill>
+            <a:ln w="6350" algn="ctr">
+              <a:solidFill>
+                <a:schemeClr val="tx1"/>
+              </a:solidFill>
+              <a:miter lim="800000"/>
+              <a:headEnd/>
+              <a:tailEnd/>
+            </a:ln>
+          </p:spPr>
+          <p:txBody>
+            <a:bodyPr lIns="90000" tIns="72000" rIns="90000" bIns="72000" rtlCol="0" anchor="ctr"/>
+            <a:lstStyle/>
+            <a:p>
+              <a:pPr marR="0" algn="ctr" defTabSz="914400" eaLnBrk="1" fontAlgn="base" latinLnBrk="0" hangingPunct="1">
+                <a:lnSpc>
+                  <a:spcPct val="100000"/>
+                </a:lnSpc>
+                <a:spcBef>
+                  <a:spcPct val="50000"/>
+                </a:spcBef>
+                <a:spcAft>
+                  <a:spcPct val="0"/>
+                </a:spcAft>
+                <a:buClr>
+                  <a:srgbClr val="F0AB00"/>
+                </a:buClr>
+                <a:buSzPct val="80000"/>
+                <a:tabLst/>
+              </a:pPr>
+              <a:r>
+                <a:rPr kumimoji="0" lang="en-US" sz="1100" b="0" i="0" u="none" strike="noStrike" kern="0" cap="none" spc="0" normalizeH="0" baseline="0" dirty="0">
+                  <a:ln>
+                    <a:noFill/>
+                  </a:ln>
+                  <a:solidFill>
+                    <a:schemeClr val="bg1"/>
+                  </a:solidFill>
+                  <a:effectLst/>
+                  <a:uLnTx/>
+                  <a:uFillTx/>
+                  <a:ea typeface="Arial Unicode MS" pitchFamily="34" charset="-128"/>
+                  <a:cs typeface="Arial Unicode MS" pitchFamily="34" charset="-128"/>
+                </a:rPr>
+                <a:t>Alpine</a:t>
+              </a:r>
+            </a:p>
+          </p:txBody>
+        </p:sp>
+        <p:sp>
+          <p:nvSpPr>
+            <p:cNvPr id="18" name="Rectangle 17">
+              <a:extLst>
+                <a:ext uri="{FF2B5EF4-FFF2-40B4-BE49-F238E27FC236}">
+                  <a16:creationId xmlns:a16="http://schemas.microsoft.com/office/drawing/2014/main" id="{DA5CED9C-6E2B-4F4C-A8AC-066852230908}"/>
+                </a:ext>
+              </a:extLst>
+            </p:cNvPr>
+            <p:cNvSpPr/>
+            <p:nvPr/>
+          </p:nvSpPr>
+          <p:spPr bwMode="gray">
+            <a:xfrm>
+              <a:off x="881430" y="3492750"/>
+              <a:ext cx="2461079" cy="243559"/>
+            </a:xfrm>
+            <a:prstGeom prst="rect">
+              <a:avLst/>
+            </a:prstGeom>
+            <a:solidFill>
+              <a:schemeClr val="accent3">
+                <a:lumMod val="50000"/>
+              </a:schemeClr>
+            </a:solidFill>
+            <a:ln w="6350" algn="ctr">
+              <a:solidFill>
+                <a:schemeClr val="tx1"/>
+              </a:solidFill>
+              <a:miter lim="800000"/>
+              <a:headEnd/>
+              <a:tailEnd/>
+            </a:ln>
+          </p:spPr>
+          <p:txBody>
+            <a:bodyPr lIns="90000" tIns="72000" rIns="90000" bIns="72000" rtlCol="0" anchor="ctr"/>
+            <a:lstStyle/>
+            <a:p>
+              <a:pPr marR="0" algn="ctr" defTabSz="914400" eaLnBrk="1" fontAlgn="base" latinLnBrk="0" hangingPunct="1">
+                <a:lnSpc>
+                  <a:spcPct val="100000"/>
+                </a:lnSpc>
+                <a:spcBef>
+                  <a:spcPct val="50000"/>
+                </a:spcBef>
+                <a:spcAft>
+                  <a:spcPct val="0"/>
+                </a:spcAft>
+                <a:buClr>
+                  <a:srgbClr val="F0AB00"/>
+                </a:buClr>
+                <a:buSzPct val="80000"/>
+                <a:tabLst/>
+              </a:pPr>
+              <a:r>
+                <a:rPr kumimoji="0" lang="en-US" sz="1100" b="0" i="0" u="none" strike="noStrike" kern="0" cap="none" spc="0" normalizeH="0" baseline="0" dirty="0" err="1">
+                  <a:ln>
+                    <a:noFill/>
+                  </a:ln>
+                  <a:solidFill>
+                    <a:schemeClr val="bg1"/>
+                  </a:solidFill>
+                  <a:effectLst/>
+                  <a:uLnTx/>
+                  <a:uFillTx/>
+                  <a:ea typeface="Arial Unicode MS" pitchFamily="34" charset="-128"/>
+                  <a:cs typeface="Arial Unicode MS" pitchFamily="34" charset="-128"/>
+                </a:rPr>
+                <a:t>golang</a:t>
+              </a:r>
+              <a:endParaRPr kumimoji="0" lang="en-US" sz="1100" b="0" i="0" u="none" strike="noStrike" kern="0" cap="none" spc="0" normalizeH="0" baseline="0" dirty="0">
+                <a:ln>
+                  <a:noFill/>
+                </a:ln>
+                <a:solidFill>
+                  <a:schemeClr val="bg1"/>
+                </a:solidFill>
+                <a:effectLst/>
+                <a:uLnTx/>
+                <a:uFillTx/>
+                <a:ea typeface="Arial Unicode MS" pitchFamily="34" charset="-128"/>
+                <a:cs typeface="Arial Unicode MS" pitchFamily="34" charset="-128"/>
+              </a:endParaRPr>
+            </a:p>
+          </p:txBody>
+        </p:sp>
+        <p:sp>
+          <p:nvSpPr>
+            <p:cNvPr id="20" name="Rectangle 19">
+              <a:extLst>
+                <a:ext uri="{FF2B5EF4-FFF2-40B4-BE49-F238E27FC236}">
+                  <a16:creationId xmlns:a16="http://schemas.microsoft.com/office/drawing/2014/main" id="{6FD5F795-AAC0-4C79-A2E6-98F44A56A491}"/>
+                </a:ext>
+              </a:extLst>
+            </p:cNvPr>
+            <p:cNvSpPr/>
+            <p:nvPr/>
+          </p:nvSpPr>
+          <p:spPr bwMode="gray">
+            <a:xfrm>
+              <a:off x="881430" y="3185095"/>
+              <a:ext cx="2461079" cy="243559"/>
+            </a:xfrm>
+            <a:prstGeom prst="rect">
+              <a:avLst/>
+            </a:prstGeom>
+            <a:solidFill>
+              <a:schemeClr val="accent3">
+                <a:lumMod val="75000"/>
+              </a:schemeClr>
+            </a:solidFill>
+            <a:ln w="6350" algn="ctr">
+              <a:solidFill>
+                <a:schemeClr val="tx1"/>
+              </a:solidFill>
+              <a:miter lim="800000"/>
+              <a:headEnd/>
+              <a:tailEnd/>
+            </a:ln>
+          </p:spPr>
+          <p:txBody>
+            <a:bodyPr lIns="90000" tIns="72000" rIns="90000" bIns="72000" rtlCol="0" anchor="ctr"/>
+            <a:lstStyle/>
+            <a:p>
+              <a:pPr marR="0" algn="ctr" defTabSz="914400" eaLnBrk="1" fontAlgn="base" latinLnBrk="0" hangingPunct="1">
+                <a:lnSpc>
+                  <a:spcPct val="100000"/>
+                </a:lnSpc>
+                <a:spcBef>
+                  <a:spcPct val="50000"/>
+                </a:spcBef>
+                <a:spcAft>
+                  <a:spcPct val="0"/>
+                </a:spcAft>
+                <a:buClr>
+                  <a:srgbClr val="F0AB00"/>
+                </a:buClr>
+                <a:buSzPct val="80000"/>
+                <a:tabLst/>
+              </a:pPr>
+              <a:r>
+                <a:rPr lang="en-US" sz="1100" kern="0" dirty="0">
+                  <a:solidFill>
+                    <a:schemeClr val="bg1"/>
+                  </a:solidFill>
+                  <a:ea typeface="Arial Unicode MS" pitchFamily="34" charset="-128"/>
+                  <a:cs typeface="Arial Unicode MS" pitchFamily="34" charset="-128"/>
+                </a:rPr>
+                <a:t>w</a:t>
+              </a:r>
+              <a:r>
+                <a:rPr kumimoji="0" lang="en-US" sz="1100" b="0" i="0" u="none" strike="noStrike" kern="0" cap="none" spc="0" normalizeH="0" baseline="0" dirty="0">
+                  <a:ln>
+                    <a:noFill/>
+                  </a:ln>
+                  <a:solidFill>
+                    <a:schemeClr val="bg1"/>
+                  </a:solidFill>
+                  <a:effectLst/>
+                  <a:uLnTx/>
+                  <a:uFillTx/>
+                  <a:ea typeface="Arial Unicode MS" pitchFamily="34" charset="-128"/>
+                  <a:cs typeface="Arial Unicode MS" pitchFamily="34" charset="-128"/>
+                </a:rPr>
+                <a:t>iki-server</a:t>
+              </a:r>
+            </a:p>
+          </p:txBody>
+        </p:sp>
+      </p:grpSp>
+      <p:sp>
+        <p:nvSpPr>
+          <p:cNvPr id="21" name="Rectangle 20">
+            <a:extLst>
+              <a:ext uri="{FF2B5EF4-FFF2-40B4-BE49-F238E27FC236}">
+                <a16:creationId xmlns:a16="http://schemas.microsoft.com/office/drawing/2014/main" id="{2B2BD01B-EB58-48E3-A0ED-93FE6B10B9DF}"/>
+              </a:ext>
+            </a:extLst>
+          </p:cNvPr>
+          <p:cNvSpPr/>
+          <p:nvPr/>
+        </p:nvSpPr>
+        <p:spPr bwMode="gray">
+          <a:xfrm>
+            <a:off x="688056" y="2266873"/>
+            <a:ext cx="2913925" cy="867959"/>
+          </a:xfrm>
+          <a:prstGeom prst="rect">
+            <a:avLst/>
+          </a:prstGeom>
+          <a:solidFill>
+            <a:schemeClr val="accent4">
+              <a:lumMod val="20000"/>
+              <a:lumOff val="80000"/>
+            </a:schemeClr>
+          </a:solidFill>
+          <a:ln>
+            <a:headEnd/>
+            <a:tailEnd/>
+          </a:ln>
+        </p:spPr>
+        <p:style>
+          <a:lnRef idx="2">
+            <a:schemeClr val="accent4">
+              <a:shade val="50000"/>
+            </a:schemeClr>
+          </a:lnRef>
+          <a:fillRef idx="1">
+            <a:schemeClr val="accent4"/>
+          </a:fillRef>
+          <a:effectRef idx="0">
+            <a:schemeClr val="accent4"/>
+          </a:effectRef>
+          <a:fontRef idx="minor">
+            <a:schemeClr val="lt1"/>
+          </a:fontRef>
+        </p:style>
+        <p:txBody>
+          <a:bodyPr lIns="540000" tIns="72000" rIns="90000" bIns="72000" rtlCol="0" anchor="ctr"/>
+          <a:lstStyle/>
+          <a:p>
+            <a:pPr defTabSz="914400" fontAlgn="base">
+              <a:spcBef>
+                <a:spcPct val="50000"/>
+              </a:spcBef>
+              <a:spcAft>
+                <a:spcPct val="0"/>
+              </a:spcAft>
+              <a:buClr>
+                <a:srgbClr val="F0AB00"/>
+              </a:buClr>
+              <a:buSzPct val="80000"/>
+            </a:pPr>
+            <a:r>
+              <a:rPr lang="en-US" sz="1400" b="1" kern="0" dirty="0">
+                <a:ln w="0"/>
+                <a:solidFill>
+                  <a:schemeClr val="tx1">
+                    <a:lumMod val="85000"/>
+                    <a:lumOff val="15000"/>
+                  </a:schemeClr>
+                </a:solidFill>
+                <a:ea typeface="Arial Unicode MS" pitchFamily="34" charset="-128"/>
+                <a:cs typeface="Arial Unicode MS" pitchFamily="34" charset="-128"/>
+              </a:rPr>
+              <a:t>writable layer</a:t>
+            </a:r>
+            <a:endParaRPr kumimoji="0" lang="en-US" sz="1400" b="1" u="none" strike="noStrike" kern="0" normalizeH="0" baseline="0" dirty="0">
+              <a:ln w="0"/>
+              <a:solidFill>
+                <a:schemeClr val="tx1">
+                  <a:lumMod val="85000"/>
+                  <a:lumOff val="15000"/>
+                </a:schemeClr>
+              </a:solidFill>
+              <a:uLnTx/>
+              <a:uFillTx/>
+              <a:ea typeface="Arial Unicode MS" pitchFamily="34" charset="-128"/>
+              <a:cs typeface="Arial Unicode MS" pitchFamily="34" charset="-128"/>
+            </a:endParaRPr>
+          </a:p>
+        </p:txBody>
+      </p:sp>
+      <p:grpSp>
+        <p:nvGrpSpPr>
+          <p:cNvPr id="47" name="Group 46">
+            <a:extLst>
+              <a:ext uri="{FF2B5EF4-FFF2-40B4-BE49-F238E27FC236}">
+                <a16:creationId xmlns:a16="http://schemas.microsoft.com/office/drawing/2014/main" id="{F886E96C-2ED2-4305-8D49-0BE88B0DB353}"/>
+              </a:ext>
+            </a:extLst>
+          </p:cNvPr>
+          <p:cNvGrpSpPr/>
+          <p:nvPr/>
+        </p:nvGrpSpPr>
+        <p:grpSpPr>
+          <a:xfrm>
+            <a:off x="5606458" y="2130846"/>
+            <a:ext cx="1289173" cy="2379548"/>
+            <a:chOff x="7238951" y="2755075"/>
+            <a:chExt cx="1289173" cy="2379548"/>
+          </a:xfrm>
+        </p:grpSpPr>
+        <p:grpSp>
+          <p:nvGrpSpPr>
+            <p:cNvPr id="8" name="Group 7">
+              <a:extLst>
+                <a:ext uri="{FF2B5EF4-FFF2-40B4-BE49-F238E27FC236}">
+                  <a16:creationId xmlns:a16="http://schemas.microsoft.com/office/drawing/2014/main" id="{B7ECFD49-E7D7-4303-B555-A6EEE434DC96}"/>
+                </a:ext>
+              </a:extLst>
+            </p:cNvPr>
+            <p:cNvGrpSpPr/>
+            <p:nvPr/>
+          </p:nvGrpSpPr>
+          <p:grpSpPr>
+            <a:xfrm>
+              <a:off x="7597213" y="2932257"/>
+              <a:ext cx="930911" cy="2202366"/>
+              <a:chOff x="7537837" y="2911727"/>
+              <a:chExt cx="930911" cy="2202366"/>
+            </a:xfrm>
+          </p:grpSpPr>
+          <p:pic>
+            <p:nvPicPr>
+              <p:cNvPr id="17" name="Picture 16"/>
+              <p:cNvPicPr>
+                <a:picLocks noChangeAspect="1"/>
+              </p:cNvPicPr>
+              <p:nvPr/>
+            </p:nvPicPr>
+            <p:blipFill>
+              <a:blip r:embed="rId3"/>
+              <a:stretch>
+                <a:fillRect/>
+              </a:stretch>
+            </p:blipFill>
+            <p:spPr>
+              <a:xfrm>
+                <a:off x="7717768" y="2911727"/>
+                <a:ext cx="571050" cy="571050"/>
+              </a:xfrm>
+              <a:prstGeom prst="rect">
+                <a:avLst/>
+              </a:prstGeom>
+            </p:spPr>
+          </p:pic>
+          <p:pic>
+            <p:nvPicPr>
+              <p:cNvPr id="27" name="Picture 26"/>
+              <p:cNvPicPr>
+                <a:picLocks noChangeAspect="1"/>
+              </p:cNvPicPr>
+              <p:nvPr/>
+            </p:nvPicPr>
+            <p:blipFill>
+              <a:blip r:embed="rId3"/>
+              <a:stretch>
+                <a:fillRect/>
+              </a:stretch>
+            </p:blipFill>
+            <p:spPr>
+              <a:xfrm>
+                <a:off x="7724026" y="3457080"/>
+                <a:ext cx="558534" cy="558534"/>
+              </a:xfrm>
+              <a:prstGeom prst="rect">
+                <a:avLst/>
+              </a:prstGeom>
+            </p:spPr>
+          </p:pic>
+          <p:pic>
+            <p:nvPicPr>
+              <p:cNvPr id="29" name="Picture 28"/>
+              <p:cNvPicPr>
+                <a:picLocks noChangeAspect="1"/>
+              </p:cNvPicPr>
+              <p:nvPr/>
+            </p:nvPicPr>
+            <p:blipFill>
+              <a:blip r:embed="rId3"/>
+              <a:stretch>
+                <a:fillRect/>
+              </a:stretch>
+            </p:blipFill>
+            <p:spPr>
+              <a:xfrm>
+                <a:off x="7723174" y="4553855"/>
+                <a:ext cx="560238" cy="560238"/>
+              </a:xfrm>
+              <a:prstGeom prst="rect">
+                <a:avLst/>
+              </a:prstGeom>
+            </p:spPr>
+          </p:pic>
+          <p:pic>
+            <p:nvPicPr>
+              <p:cNvPr id="30" name="Picture 29"/>
+              <p:cNvPicPr>
+                <a:picLocks noChangeAspect="1"/>
+              </p:cNvPicPr>
+              <p:nvPr/>
+            </p:nvPicPr>
+            <p:blipFill>
+              <a:blip r:embed="rId3"/>
+              <a:stretch>
+                <a:fillRect/>
+              </a:stretch>
+            </p:blipFill>
+            <p:spPr>
+              <a:xfrm>
+                <a:off x="7537837" y="3823165"/>
+                <a:ext cx="930911" cy="930911"/>
+              </a:xfrm>
+              <a:prstGeom prst="rect">
+                <a:avLst/>
+              </a:prstGeom>
+            </p:spPr>
+          </p:pic>
+        </p:grpSp>
+        <p:grpSp>
+          <p:nvGrpSpPr>
+            <p:cNvPr id="46" name="Group 45">
+              <a:extLst>
+                <a:ext uri="{FF2B5EF4-FFF2-40B4-BE49-F238E27FC236}">
+                  <a16:creationId xmlns:a16="http://schemas.microsoft.com/office/drawing/2014/main" id="{34CFC0F4-F9A2-48BD-BCB7-4B42201CEFF9}"/>
+                </a:ext>
+              </a:extLst>
+            </p:cNvPr>
+            <p:cNvGrpSpPr/>
+            <p:nvPr/>
+          </p:nvGrpSpPr>
+          <p:grpSpPr>
+            <a:xfrm>
+              <a:off x="7238951" y="2755075"/>
+              <a:ext cx="544449" cy="2099429"/>
+              <a:chOff x="7350826" y="2755075"/>
+              <a:chExt cx="374486" cy="2099429"/>
+            </a:xfrm>
+          </p:grpSpPr>
+          <p:cxnSp>
+            <p:nvCxnSpPr>
+              <p:cNvPr id="10" name="Straight Connector 9">
+                <a:extLst>
+                  <a:ext uri="{FF2B5EF4-FFF2-40B4-BE49-F238E27FC236}">
+                    <a16:creationId xmlns:a16="http://schemas.microsoft.com/office/drawing/2014/main" id="{E183B98C-1BAE-4B03-9430-1594DB2EA6EE}"/>
+                  </a:ext>
+                </a:extLst>
+              </p:cNvPr>
+              <p:cNvCxnSpPr>
+                <a:cxnSpLocks/>
+              </p:cNvCxnSpPr>
+              <p:nvPr/>
+            </p:nvCxnSpPr>
+            <p:spPr>
+              <a:xfrm>
+                <a:off x="7350826" y="2755075"/>
+                <a:ext cx="0" cy="2099428"/>
+              </a:xfrm>
+              <a:prstGeom prst="line">
+                <a:avLst/>
+              </a:prstGeom>
+              <a:ln w="31750">
+                <a:solidFill>
+                  <a:schemeClr val="tx1"/>
+                </a:solidFill>
+                <a:headEnd type="none" w="med" len="med"/>
+                <a:tailEnd type="none" w="med" len="med"/>
+              </a:ln>
+            </p:spPr>
+            <p:style>
+              <a:lnRef idx="1">
+                <a:schemeClr val="accent1"/>
+              </a:lnRef>
+              <a:fillRef idx="0">
+                <a:schemeClr val="accent1"/>
+              </a:fillRef>
+              <a:effectRef idx="0">
+                <a:schemeClr val="accent1"/>
+              </a:effectRef>
+              <a:fontRef idx="minor">
+                <a:schemeClr val="tx1"/>
+              </a:fontRef>
+            </p:style>
+          </p:cxnSp>
+          <p:cxnSp>
+            <p:nvCxnSpPr>
+              <p:cNvPr id="24" name="Straight Connector 23">
+                <a:extLst>
+                  <a:ext uri="{FF2B5EF4-FFF2-40B4-BE49-F238E27FC236}">
+                    <a16:creationId xmlns:a16="http://schemas.microsoft.com/office/drawing/2014/main" id="{C20F7DB4-95BB-4ADA-A99B-5037980A2B59}"/>
+                  </a:ext>
+                </a:extLst>
+              </p:cNvPr>
+              <p:cNvCxnSpPr>
+                <a:cxnSpLocks/>
+                <a:stCxn id="29" idx="1"/>
+              </p:cNvCxnSpPr>
+              <p:nvPr/>
+            </p:nvCxnSpPr>
+            <p:spPr>
+              <a:xfrm flipH="1">
+                <a:off x="7350827" y="4854504"/>
+                <a:ext cx="373901" cy="0"/>
+              </a:xfrm>
+              <a:prstGeom prst="line">
+                <a:avLst/>
+              </a:prstGeom>
+              <a:ln w="31750">
+                <a:solidFill>
+                  <a:schemeClr val="tx1"/>
+                </a:solidFill>
+                <a:headEnd type="none" w="med" len="med"/>
+                <a:tailEnd type="none" w="med" len="med"/>
+              </a:ln>
+            </p:spPr>
+            <p:style>
+              <a:lnRef idx="1">
+                <a:schemeClr val="accent1"/>
+              </a:lnRef>
+              <a:fillRef idx="0">
+                <a:schemeClr val="accent1"/>
+              </a:fillRef>
+              <a:effectRef idx="0">
+                <a:schemeClr val="accent1"/>
+              </a:effectRef>
+              <a:fontRef idx="minor">
+                <a:schemeClr val="tx1"/>
+              </a:fontRef>
+            </p:style>
+          </p:cxnSp>
+          <p:cxnSp>
+            <p:nvCxnSpPr>
+              <p:cNvPr id="37" name="Straight Connector 36">
+                <a:extLst>
+                  <a:ext uri="{FF2B5EF4-FFF2-40B4-BE49-F238E27FC236}">
+                    <a16:creationId xmlns:a16="http://schemas.microsoft.com/office/drawing/2014/main" id="{8965C9DD-E2CD-4FA8-A841-048E86ABCD5C}"/>
+                  </a:ext>
+                </a:extLst>
+              </p:cNvPr>
+              <p:cNvCxnSpPr>
+                <a:cxnSpLocks/>
+                <a:stCxn id="30" idx="1"/>
+              </p:cNvCxnSpPr>
+              <p:nvPr/>
+            </p:nvCxnSpPr>
+            <p:spPr>
+              <a:xfrm flipH="1">
+                <a:off x="7350827" y="4309151"/>
+                <a:ext cx="246386" cy="0"/>
+              </a:xfrm>
+              <a:prstGeom prst="line">
+                <a:avLst/>
+              </a:prstGeom>
+              <a:ln w="31750">
+                <a:solidFill>
+                  <a:schemeClr val="tx1"/>
+                </a:solidFill>
+                <a:headEnd type="none" w="med" len="med"/>
+                <a:tailEnd type="none" w="med" len="med"/>
+              </a:ln>
+            </p:spPr>
+            <p:style>
+              <a:lnRef idx="1">
+                <a:schemeClr val="accent1"/>
+              </a:lnRef>
+              <a:fillRef idx="0">
+                <a:schemeClr val="accent1"/>
+              </a:fillRef>
+              <a:effectRef idx="0">
+                <a:schemeClr val="accent1"/>
+              </a:effectRef>
+              <a:fontRef idx="minor">
+                <a:schemeClr val="tx1"/>
+              </a:fontRef>
+            </p:style>
+          </p:cxnSp>
+          <p:cxnSp>
+            <p:nvCxnSpPr>
+              <p:cNvPr id="39" name="Straight Connector 38">
+                <a:extLst>
+                  <a:ext uri="{FF2B5EF4-FFF2-40B4-BE49-F238E27FC236}">
+                    <a16:creationId xmlns:a16="http://schemas.microsoft.com/office/drawing/2014/main" id="{C433907A-3D6E-4542-A5ED-3400BECB84FB}"/>
+                  </a:ext>
+                </a:extLst>
+              </p:cNvPr>
+              <p:cNvCxnSpPr>
+                <a:cxnSpLocks/>
+                <a:stCxn id="27" idx="1"/>
+              </p:cNvCxnSpPr>
+              <p:nvPr/>
+            </p:nvCxnSpPr>
+            <p:spPr>
+              <a:xfrm flipH="1">
+                <a:off x="7350836" y="3756877"/>
+                <a:ext cx="374476" cy="0"/>
+              </a:xfrm>
+              <a:prstGeom prst="line">
+                <a:avLst/>
+              </a:prstGeom>
+              <a:ln w="31750">
+                <a:solidFill>
+                  <a:schemeClr val="tx1"/>
+                </a:solidFill>
+                <a:headEnd type="none" w="med" len="med"/>
+                <a:tailEnd type="none" w="med" len="med"/>
+              </a:ln>
+            </p:spPr>
+            <p:style>
+              <a:lnRef idx="1">
+                <a:schemeClr val="accent1"/>
+              </a:lnRef>
+              <a:fillRef idx="0">
+                <a:schemeClr val="accent1"/>
+              </a:fillRef>
+              <a:effectRef idx="0">
+                <a:schemeClr val="accent1"/>
+              </a:effectRef>
+              <a:fontRef idx="minor">
+                <a:schemeClr val="tx1"/>
+              </a:fontRef>
+            </p:style>
+          </p:cxnSp>
+          <p:cxnSp>
+            <p:nvCxnSpPr>
+              <p:cNvPr id="41" name="Straight Connector 40">
+                <a:extLst>
+                  <a:ext uri="{FF2B5EF4-FFF2-40B4-BE49-F238E27FC236}">
+                    <a16:creationId xmlns:a16="http://schemas.microsoft.com/office/drawing/2014/main" id="{413428F3-C3AF-4E41-8CFF-C87AEE67790C}"/>
+                  </a:ext>
+                </a:extLst>
+              </p:cNvPr>
+              <p:cNvCxnSpPr>
+                <a:cxnSpLocks/>
+                <a:stCxn id="17" idx="1"/>
+              </p:cNvCxnSpPr>
+              <p:nvPr/>
+            </p:nvCxnSpPr>
+            <p:spPr>
+              <a:xfrm flipH="1">
+                <a:off x="7350827" y="3217782"/>
+                <a:ext cx="370182" cy="0"/>
+              </a:xfrm>
+              <a:prstGeom prst="line">
+                <a:avLst/>
+              </a:prstGeom>
+              <a:ln w="31750">
+                <a:solidFill>
+                  <a:schemeClr val="tx1"/>
+                </a:solidFill>
+                <a:headEnd type="none" w="med" len="med"/>
+                <a:tailEnd type="none" w="med" len="med"/>
+              </a:ln>
+            </p:spPr>
+            <p:style>
+              <a:lnRef idx="1">
+                <a:schemeClr val="accent1"/>
+              </a:lnRef>
+              <a:fillRef idx="0">
+                <a:schemeClr val="accent1"/>
+              </a:fillRef>
+              <a:effectRef idx="0">
+                <a:schemeClr val="accent1"/>
+              </a:effectRef>
+              <a:fontRef idx="minor">
+                <a:schemeClr val="tx1"/>
+              </a:fontRef>
+            </p:style>
+          </p:cxnSp>
+        </p:grpSp>
+      </p:grpSp>
+      <p:pic>
+        <p:nvPicPr>
+          <p:cNvPr id="48" name="Picture 47">
+            <a:extLst>
+              <a:ext uri="{FF2B5EF4-FFF2-40B4-BE49-F238E27FC236}">
+                <a16:creationId xmlns:a16="http://schemas.microsoft.com/office/drawing/2014/main" id="{60B31A11-F3EB-4E98-817A-6B2847BE92C5}"/>
+              </a:ext>
+            </a:extLst>
+          </p:cNvPr>
+          <p:cNvPicPr>
+            <a:picLocks noChangeAspect="1"/>
+          </p:cNvPicPr>
+          <p:nvPr/>
+        </p:nvPicPr>
+        <p:blipFill>
+          <a:blip r:embed="rId3"/>
+          <a:stretch>
+            <a:fillRect/>
+          </a:stretch>
+        </p:blipFill>
+        <p:spPr>
+          <a:xfrm>
+            <a:off x="2758371" y="2387239"/>
+            <a:ext cx="633461" cy="633461"/>
+          </a:xfrm>
+          <a:prstGeom prst="rect">
+            <a:avLst/>
+          </a:prstGeom>
+        </p:spPr>
+      </p:pic>
+      <p:sp>
+        <p:nvSpPr>
+          <p:cNvPr id="61" name="Speech Bubble: Rectangle 60">
+            <a:extLst>
+              <a:ext uri="{FF2B5EF4-FFF2-40B4-BE49-F238E27FC236}">
+                <a16:creationId xmlns:a16="http://schemas.microsoft.com/office/drawing/2014/main" id="{5C5CB96B-C1DD-45A6-BA39-3340CA4C5EF9}"/>
+              </a:ext>
+            </a:extLst>
+          </p:cNvPr>
+          <p:cNvSpPr/>
+          <p:nvPr/>
+        </p:nvSpPr>
+        <p:spPr bwMode="gray">
+          <a:xfrm>
+            <a:off x="1090375" y="5246229"/>
+            <a:ext cx="2401326" cy="418823"/>
+          </a:xfrm>
+          <a:prstGeom prst="wedgeRectCallout">
+            <a:avLst>
+              <a:gd name="adj1" fmla="val 98049"/>
+              <a:gd name="adj2" fmla="val -93088"/>
+            </a:avLst>
+          </a:prstGeom>
+          <a:noFill/>
+          <a:ln w="6350" algn="ctr">
+            <a:solidFill>
+              <a:srgbClr val="C00000"/>
+            </a:solidFill>
+            <a:miter lim="800000"/>
+            <a:headEnd/>
+            <a:tailEnd/>
+          </a:ln>
+        </p:spPr>
+        <p:txBody>
+          <a:bodyPr lIns="90000" tIns="72000" rIns="90000" bIns="72000" rtlCol="0" anchor="ctr"/>
+          <a:lstStyle/>
+          <a:p>
+            <a:pPr marR="0" algn="ctr" defTabSz="914400" eaLnBrk="1" fontAlgn="base" latinLnBrk="0" hangingPunct="1">
+              <a:lnSpc>
+                <a:spcPct val="100000"/>
+              </a:lnSpc>
+              <a:spcBef>
+                <a:spcPct val="50000"/>
+              </a:spcBef>
+              <a:spcAft>
+                <a:spcPct val="0"/>
+              </a:spcAft>
+              <a:buClr>
+                <a:srgbClr val="F0AB00"/>
+              </a:buClr>
+              <a:buSzPct val="80000"/>
+              <a:tabLst/>
+            </a:pPr>
+            <a:r>
+              <a:rPr kumimoji="0" lang="en-US" sz="1800" b="0" i="0" u="none" strike="noStrike" kern="0" cap="none" spc="0" normalizeH="0" baseline="0" noProof="0" dirty="0">
+                <a:ln>
+                  <a:noFill/>
+                </a:ln>
+                <a:effectLst/>
+                <a:uLnTx/>
+                <a:uFillTx/>
+                <a:ea typeface="Arial Unicode MS" pitchFamily="34" charset="-128"/>
+                <a:cs typeface="Arial Unicode MS" pitchFamily="34" charset="-128"/>
+              </a:rPr>
+              <a:t>Volume mount</a:t>
+            </a:r>
+          </a:p>
+        </p:txBody>
+      </p:sp>
+      <p:cxnSp>
+        <p:nvCxnSpPr>
+          <p:cNvPr id="26" name="Straight Connector 25">
+            <a:extLst>
+              <a:ext uri="{FF2B5EF4-FFF2-40B4-BE49-F238E27FC236}">
+                <a16:creationId xmlns:a16="http://schemas.microsoft.com/office/drawing/2014/main" id="{ED15DC52-41D9-430D-8549-44698C9BA01C}"/>
+              </a:ext>
+            </a:extLst>
+          </p:cNvPr>
+          <p:cNvCxnSpPr>
+            <a:cxnSpLocks/>
+          </p:cNvCxnSpPr>
+          <p:nvPr/>
+        </p:nvCxnSpPr>
+        <p:spPr>
+          <a:xfrm>
+            <a:off x="6895631" y="3684921"/>
+            <a:ext cx="223325" cy="0"/>
+          </a:xfrm>
+          <a:prstGeom prst="line">
+            <a:avLst/>
+          </a:prstGeom>
+          <a:ln w="50800" cap="rnd">
+            <a:headEnd type="none" w="med" len="med"/>
+            <a:tailEnd type="none" w="med" len="med"/>
+          </a:ln>
+        </p:spPr>
+        <p:style>
+          <a:lnRef idx="1">
+            <a:schemeClr val="accent5"/>
+          </a:lnRef>
+          <a:fillRef idx="0">
+            <a:schemeClr val="accent5"/>
+          </a:fillRef>
+          <a:effectRef idx="0">
+            <a:schemeClr val="accent5"/>
+          </a:effectRef>
+          <a:fontRef idx="minor">
+            <a:schemeClr val="tx1"/>
+          </a:fontRef>
+        </p:style>
+      </p:cxnSp>
+      <p:cxnSp>
+        <p:nvCxnSpPr>
+          <p:cNvPr id="31" name="Straight Connector 30">
+            <a:extLst>
+              <a:ext uri="{FF2B5EF4-FFF2-40B4-BE49-F238E27FC236}">
+                <a16:creationId xmlns:a16="http://schemas.microsoft.com/office/drawing/2014/main" id="{5FDE4011-0962-4593-8B90-63D731558D23}"/>
+              </a:ext>
+            </a:extLst>
+          </p:cNvPr>
+          <p:cNvCxnSpPr>
+            <a:cxnSpLocks/>
+          </p:cNvCxnSpPr>
+          <p:nvPr/>
+        </p:nvCxnSpPr>
+        <p:spPr>
+          <a:xfrm>
+            <a:off x="7118956" y="3684921"/>
+            <a:ext cx="0" cy="1401429"/>
+          </a:xfrm>
+          <a:prstGeom prst="line">
+            <a:avLst/>
+          </a:prstGeom>
+          <a:ln w="50800" cap="rnd">
+            <a:headEnd type="none" w="med" len="med"/>
+            <a:tailEnd type="none" w="med" len="med"/>
+          </a:ln>
+        </p:spPr>
+        <p:style>
+          <a:lnRef idx="1">
+            <a:schemeClr val="accent5"/>
+          </a:lnRef>
+          <a:fillRef idx="0">
+            <a:schemeClr val="accent5"/>
+          </a:fillRef>
+          <a:effectRef idx="0">
+            <a:schemeClr val="accent5"/>
+          </a:effectRef>
+          <a:fontRef idx="minor">
+            <a:schemeClr val="tx1"/>
+          </a:fontRef>
+        </p:style>
+      </p:cxnSp>
+      <p:cxnSp>
+        <p:nvCxnSpPr>
+          <p:cNvPr id="33" name="Straight Connector 32">
+            <a:extLst>
+              <a:ext uri="{FF2B5EF4-FFF2-40B4-BE49-F238E27FC236}">
+                <a16:creationId xmlns:a16="http://schemas.microsoft.com/office/drawing/2014/main" id="{A363E0CE-6AF5-49EC-9B52-353268A1C6EC}"/>
+              </a:ext>
+            </a:extLst>
+          </p:cNvPr>
+          <p:cNvCxnSpPr>
+            <a:cxnSpLocks/>
+          </p:cNvCxnSpPr>
+          <p:nvPr/>
+        </p:nvCxnSpPr>
+        <p:spPr>
+          <a:xfrm flipH="1">
+            <a:off x="4733926" y="5086350"/>
+            <a:ext cx="2385030" cy="0"/>
+          </a:xfrm>
+          <a:prstGeom prst="line">
+            <a:avLst/>
+          </a:prstGeom>
+          <a:ln w="50800" cap="rnd">
+            <a:headEnd type="none" w="med" len="med"/>
+            <a:tailEnd type="none" w="med" len="med"/>
+          </a:ln>
+        </p:spPr>
+        <p:style>
+          <a:lnRef idx="1">
+            <a:schemeClr val="accent5"/>
+          </a:lnRef>
+          <a:fillRef idx="0">
+            <a:schemeClr val="accent5"/>
+          </a:fillRef>
+          <a:effectRef idx="0">
+            <a:schemeClr val="accent5"/>
+          </a:effectRef>
+          <a:fontRef idx="minor">
+            <a:schemeClr val="tx1"/>
+          </a:fontRef>
+        </p:style>
+      </p:cxnSp>
+      <p:cxnSp>
+        <p:nvCxnSpPr>
+          <p:cNvPr id="35" name="Straight Connector 34">
+            <a:extLst>
+              <a:ext uri="{FF2B5EF4-FFF2-40B4-BE49-F238E27FC236}">
+                <a16:creationId xmlns:a16="http://schemas.microsoft.com/office/drawing/2014/main" id="{5541CB42-B963-4834-A3D6-F6D10D8E9804}"/>
+              </a:ext>
+            </a:extLst>
+          </p:cNvPr>
+          <p:cNvCxnSpPr/>
+          <p:nvPr/>
+        </p:nvCxnSpPr>
+        <p:spPr>
+          <a:xfrm flipV="1">
+            <a:off x="4733925" y="2700852"/>
+            <a:ext cx="0" cy="2375973"/>
+          </a:xfrm>
+          <a:prstGeom prst="line">
+            <a:avLst/>
+          </a:prstGeom>
+          <a:ln w="50800" cap="rnd">
+            <a:headEnd type="none" w="med" len="med"/>
+            <a:tailEnd type="none" w="med" len="med"/>
+          </a:ln>
+        </p:spPr>
+        <p:style>
+          <a:lnRef idx="1">
+            <a:schemeClr val="accent5"/>
+          </a:lnRef>
+          <a:fillRef idx="0">
+            <a:schemeClr val="accent5"/>
+          </a:fillRef>
+          <a:effectRef idx="0">
+            <a:schemeClr val="accent5"/>
+          </a:effectRef>
+          <a:fontRef idx="minor">
+            <a:schemeClr val="tx1"/>
+          </a:fontRef>
+        </p:style>
+      </p:cxnSp>
+      <p:cxnSp>
+        <p:nvCxnSpPr>
+          <p:cNvPr id="38" name="Straight Arrow Connector 37">
+            <a:extLst>
+              <a:ext uri="{FF2B5EF4-FFF2-40B4-BE49-F238E27FC236}">
+                <a16:creationId xmlns:a16="http://schemas.microsoft.com/office/drawing/2014/main" id="{991A4A48-888F-424B-A51D-0176E5345C81}"/>
+              </a:ext>
+            </a:extLst>
+          </p:cNvPr>
+          <p:cNvCxnSpPr>
+            <a:endCxn id="48" idx="3"/>
+          </p:cNvCxnSpPr>
+          <p:nvPr/>
+        </p:nvCxnSpPr>
+        <p:spPr>
+          <a:xfrm flipH="1">
+            <a:off x="3391832" y="2700852"/>
+            <a:ext cx="1332568" cy="3118"/>
+          </a:xfrm>
+          <a:prstGeom prst="straightConnector1">
+            <a:avLst/>
+          </a:prstGeom>
+          <a:ln w="50800" cap="rnd">
+            <a:headEnd type="none" w="med" len="med"/>
+            <a:tailEnd type="triangle"/>
+          </a:ln>
+        </p:spPr>
+        <p:style>
+          <a:lnRef idx="1">
+            <a:schemeClr val="accent5"/>
+          </a:lnRef>
+          <a:fillRef idx="0">
+            <a:schemeClr val="accent5"/>
+          </a:fillRef>
+          <a:effectRef idx="0">
+            <a:schemeClr val="accent5"/>
+          </a:effectRef>
+          <a:fontRef idx="minor">
+            <a:schemeClr val="tx1"/>
+          </a:fontRef>
+        </p:style>
+      </p:cxnSp>
+      <p:sp>
+        <p:nvSpPr>
+          <p:cNvPr id="49" name="Text Placeholder 10">
+            <a:extLst>
+              <a:ext uri="{FF2B5EF4-FFF2-40B4-BE49-F238E27FC236}">
+                <a16:creationId xmlns:a16="http://schemas.microsoft.com/office/drawing/2014/main" id="{B66C6C8D-BCC1-4270-87F9-C211EF374EAB}"/>
+              </a:ext>
+            </a:extLst>
+          </p:cNvPr>
+          <p:cNvSpPr>
+            <a:spLocks noGrp="1"/>
+          </p:cNvSpPr>
+          <p:nvPr>
+            <p:ph type="body" sz="quarter" idx="10"/>
+          </p:nvPr>
+        </p:nvSpPr>
+        <p:spPr>
+          <a:xfrm>
+            <a:off x="8262588" y="1323527"/>
+            <a:ext cx="2957919" cy="3519693"/>
+          </a:xfrm>
+        </p:spPr>
+        <p:txBody>
+          <a:bodyPr anchor="ctr"/>
+          <a:lstStyle/>
+          <a:p>
+            <a:r>
+              <a:rPr lang="en-US" sz="1800" dirty="0"/>
+              <a:t>Bind mounts</a:t>
+            </a:r>
+          </a:p>
+          <a:p>
+            <a:pPr lvl="1"/>
+            <a:r>
+              <a:rPr lang="en-US" sz="1600" dirty="0"/>
+              <a:t>Hides everything in destination directory</a:t>
+            </a:r>
+          </a:p>
+          <a:p>
+            <a:pPr marL="0" lvl="1" indent="0">
+              <a:buNone/>
+            </a:pPr>
+            <a:endParaRPr lang="en-US" sz="1600" dirty="0"/>
+          </a:p>
+          <a:p>
+            <a:pPr marL="0" lvl="1" indent="0">
+              <a:buNone/>
+            </a:pPr>
+            <a:r>
+              <a:rPr lang="en-US" dirty="0"/>
+              <a:t>Named volumes</a:t>
+            </a:r>
+          </a:p>
+          <a:p>
+            <a:pPr lvl="1"/>
+            <a:r>
+              <a:rPr lang="en-US" sz="1600" dirty="0"/>
+              <a:t>Contents in container are </a:t>
+            </a:r>
+            <a:r>
+              <a:rPr lang="en-US" sz="1600" i="1" dirty="0"/>
+              <a:t>merged</a:t>
+            </a:r>
+            <a:r>
+              <a:rPr lang="en-US" sz="1600" dirty="0"/>
+              <a:t> with volume</a:t>
+            </a:r>
+          </a:p>
+          <a:p>
+            <a:pPr lvl="1"/>
+            <a:r>
+              <a:rPr lang="en-US" sz="1600" dirty="0"/>
+              <a:t>No straightforward access from host</a:t>
+            </a:r>
+          </a:p>
+        </p:txBody>
+      </p:sp>
+    </p:spTree>
+    <p:extLst>
+      <p:ext uri="{BB962C8B-B14F-4D97-AF65-F5344CB8AC3E}">
+        <p14:creationId xmlns:p14="http://schemas.microsoft.com/office/powerpoint/2010/main" val="3492311514"/>
+      </p:ext>
+    </p:extLst>
+  </p:cSld>
+  <p:clrMapOvr>
+    <a:masterClrMapping/>
+  </p:clrMapOvr>
+  <p:timing>
+    <p:tnLst>
+      <p:par>
+        <p:cTn id="1" dur="indefinite" restart="never" nodeType="tmRoot">
+          <p:childTnLst>
+            <p:seq concurrent="1" nextAc="seek">
+              <p:cTn id="2" dur="indefinite" nodeType="mainSeq">
+                <p:childTnLst>
+                  <p:par>
+                    <p:cTn id="3" fill="hold">
+                      <p:stCondLst>
+                        <p:cond delay="indefinite"/>
+                        <p:cond evt="onBegin" delay="0">
+                          <p:tn val="2"/>
+                        </p:cond>
+                      </p:stCondLst>
+                      <p:childTnLst>
+                        <p:par>
+                          <p:cTn id="4" fill="hold">
+                            <p:stCondLst>
+                              <p:cond delay="0"/>
+                            </p:stCondLst>
+                            <p:childTnLst>
+                              <p:par>
+                                <p:cTn id="5" presetID="1" presetClass="entr" presetSubtype="0" fill="hold" grpId="0" nodeType="withEffect">
+                                  <p:stCondLst>
+                                    <p:cond delay="0"/>
+                                  </p:stCondLst>
+                                  <p:childTnLst>
+                                    <p:set>
+                                      <p:cBhvr>
+                                        <p:cTn id="6" dur="1" fill="hold">
+                                          <p:stCondLst>
+                                            <p:cond delay="0"/>
+                                          </p:stCondLst>
+                                        </p:cTn>
+                                        <p:tgtEl>
+                                          <p:spTgt spid="61"/>
+                                        </p:tgtEl>
+                                        <p:attrNameLst>
+                                          <p:attrName>style.visibility</p:attrName>
+                                        </p:attrNameLst>
+                                      </p:cBhvr>
+                                      <p:to>
+                                        <p:strVal val="visible"/>
+                                      </p:to>
+                                    </p:set>
+                                  </p:childTnLst>
+                                </p:cTn>
+                              </p:par>
+                            </p:childTnLst>
+                          </p:cTn>
+                        </p:par>
+                        <p:par>
+                          <p:cTn id="7" fill="hold">
+                            <p:stCondLst>
+                              <p:cond delay="0"/>
+                            </p:stCondLst>
+                            <p:childTnLst>
+                              <p:par>
+                                <p:cTn id="8" presetID="10" presetClass="entr" presetSubtype="0" fill="hold" nodeType="afterEffect">
+                                  <p:stCondLst>
+                                    <p:cond delay="0"/>
+                                  </p:stCondLst>
+                                  <p:childTnLst>
+                                    <p:set>
+                                      <p:cBhvr>
+                                        <p:cTn id="9" dur="1" fill="hold">
+                                          <p:stCondLst>
+                                            <p:cond delay="0"/>
+                                          </p:stCondLst>
+                                        </p:cTn>
+                                        <p:tgtEl>
+                                          <p:spTgt spid="48"/>
+                                        </p:tgtEl>
+                                        <p:attrNameLst>
+                                          <p:attrName>style.visibility</p:attrName>
+                                        </p:attrNameLst>
+                                      </p:cBhvr>
+                                      <p:to>
+                                        <p:strVal val="visible"/>
+                                      </p:to>
+                                    </p:set>
+                                    <p:animEffect transition="in" filter="fade">
+                                      <p:cBhvr>
+                                        <p:cTn id="10" dur="500"/>
+                                        <p:tgtEl>
+                                          <p:spTgt spid="48"/>
+                                        </p:tgtEl>
+                                      </p:cBhvr>
+                                    </p:animEffect>
+                                  </p:childTnLst>
+                                </p:cTn>
+                              </p:par>
+                            </p:childTnLst>
+                          </p:cTn>
+                        </p:par>
+                      </p:childTnLst>
+                    </p:cTn>
+                  </p:par>
+                </p:childTnLst>
+              </p:cTn>
+              <p:prevCondLst>
+                <p:cond evt="onPrev" delay="0">
+                  <p:tgtEl>
+                    <p:sldTgt/>
+                  </p:tgtEl>
+                </p:cond>
+              </p:prevCondLst>
+              <p:nextCondLst>
+                <p:cond evt="onNext" delay="0">
+                  <p:tgtEl>
+                    <p:sldTgt/>
+                  </p:tgtEl>
+                </p:cond>
+              </p:nextCondLst>
+            </p:seq>
+          </p:childTnLst>
+        </p:cTn>
+      </p:par>
+    </p:tnLst>
+    <p:bldLst>
+      <p:bldP spid="61" grpId="0" animBg="1"/>
+    </p:bldLst>
+  </p:timing>
+</p:sld>
+</file>
+
+<file path=ppt/slides/slide27.xml><?xml version="1.0" encoding="utf-8"?>
+<p:sld xmlns:a="http://schemas.openxmlformats.org/drawingml/2006/main" xmlns:r="http://schemas.openxmlformats.org/officeDocument/2006/relationships" xmlns:p="http://schemas.openxmlformats.org/presentationml/2006/main">
+  <p:cSld>
+    <p:spTree>
+      <p:nvGrpSpPr>
+        <p:cNvPr id="1" name=""/>
+        <p:cNvGrpSpPr/>
+        <p:nvPr/>
+      </p:nvGrpSpPr>
+      <p:grpSpPr>
+        <a:xfrm>
+          <a:off x="0" y="0"/>
+          <a:ext cx="0" cy="0"/>
+          <a:chOff x="0" y="0"/>
+          <a:chExt cx="0" cy="0"/>
+        </a:xfrm>
+      </p:grpSpPr>
+      <p:sp>
+        <p:nvSpPr>
           <p:cNvPr id="11" name="Text Placeholder 10"/>
           <p:cNvSpPr>
             <a:spLocks noGrp="1"/>
@@ -35057,7 +36894,7 @@
         </p:nvSpPr>
         <p:spPr>
           <a:xfrm>
-            <a:off x="503999" y="1570378"/>
+            <a:off x="805556" y="1314000"/>
             <a:ext cx="11186477" cy="4230000"/>
           </a:xfrm>
         </p:spPr>
@@ -35538,7 +37375,7 @@
 </p:sld>
 </file>
 
-<file path=ppt/slides/slide27.xml><?xml version="1.0" encoding="utf-8"?>
+<file path=ppt/slides/slide28.xml><?xml version="1.0" encoding="utf-8"?>
 <p:sld xmlns:a="http://schemas.openxmlformats.org/drawingml/2006/main" xmlns:r="http://schemas.openxmlformats.org/officeDocument/2006/relationships" xmlns:p="http://schemas.openxmlformats.org/presentationml/2006/main">
   <p:cSld>
     <p:spTree>
@@ -35626,7 +37463,7 @@
 </p:sld>
 </file>
 
-<file path=ppt/slides/slide28.xml><?xml version="1.0" encoding="utf-8"?>
+<file path=ppt/slides/slide29.xml><?xml version="1.0" encoding="utf-8"?>
 <p:sld xmlns:a="http://schemas.openxmlformats.org/drawingml/2006/main" xmlns:r="http://schemas.openxmlformats.org/officeDocument/2006/relationships" xmlns:p="http://schemas.openxmlformats.org/presentationml/2006/main">
   <p:cSld>
     <p:spTree>
@@ -35711,37 +37548,6 @@
   <p:clrMapOvr>
     <a:masterClrMapping/>
   </p:clrMapOvr>
-</p:sld>
-</file>
-
-<file path=ppt/slides/slide29.xml><?xml version="1.0" encoding="utf-8"?>
-<p:sld xmlns:a="http://schemas.openxmlformats.org/drawingml/2006/main" xmlns:r="http://schemas.openxmlformats.org/officeDocument/2006/relationships" xmlns:p="http://schemas.openxmlformats.org/presentationml/2006/main" show="0">
-  <p:cSld>
-    <p:spTree>
-      <p:nvGrpSpPr>
-        <p:cNvPr id="1" name=""/>
-        <p:cNvGrpSpPr/>
-        <p:nvPr/>
-      </p:nvGrpSpPr>
-      <p:grpSpPr>
-        <a:xfrm>
-          <a:off x="0" y="0"/>
-          <a:ext cx="0" cy="0"/>
-          <a:chOff x="0" y="0"/>
-          <a:chExt cx="0" cy="0"/>
-        </a:xfrm>
-      </p:grpSpPr>
-    </p:spTree>
-    <p:extLst>
-      <p:ext uri="{BB962C8B-B14F-4D97-AF65-F5344CB8AC3E}">
-        <p14:creationId xmlns:p14="http://schemas.microsoft.com/office/powerpoint/2010/main" val="1134366319"/>
-      </p:ext>
-    </p:extLst>
-  </p:cSld>
-  <p:clrMapOvr>
-    <a:masterClrMapping/>
-  </p:clrMapOvr>
-  <p:transition spd="med"/>
 </p:sld>
 </file>
 
@@ -36799,6 +38605,37 @@
 </file>
 
 <file path=ppt/slides/slide30.xml><?xml version="1.0" encoding="utf-8"?>
+<p:sld xmlns:a="http://schemas.openxmlformats.org/drawingml/2006/main" xmlns:r="http://schemas.openxmlformats.org/officeDocument/2006/relationships" xmlns:p="http://schemas.openxmlformats.org/presentationml/2006/main" show="0">
+  <p:cSld>
+    <p:spTree>
+      <p:nvGrpSpPr>
+        <p:cNvPr id="1" name=""/>
+        <p:cNvGrpSpPr/>
+        <p:nvPr/>
+      </p:nvGrpSpPr>
+      <p:grpSpPr>
+        <a:xfrm>
+          <a:off x="0" y="0"/>
+          <a:ext cx="0" cy="0"/>
+          <a:chOff x="0" y="0"/>
+          <a:chExt cx="0" cy="0"/>
+        </a:xfrm>
+      </p:grpSpPr>
+    </p:spTree>
+    <p:extLst>
+      <p:ext uri="{BB962C8B-B14F-4D97-AF65-F5344CB8AC3E}">
+        <p14:creationId xmlns:p14="http://schemas.microsoft.com/office/powerpoint/2010/main" val="1134366319"/>
+      </p:ext>
+    </p:extLst>
+  </p:cSld>
+  <p:clrMapOvr>
+    <a:masterClrMapping/>
+  </p:clrMapOvr>
+  <p:transition spd="med"/>
+</p:sld>
+</file>
+
+<file path=ppt/slides/slide31.xml><?xml version="1.0" encoding="utf-8"?>
 <p:sld xmlns:a="http://schemas.openxmlformats.org/drawingml/2006/main" xmlns:r="http://schemas.openxmlformats.org/officeDocument/2006/relationships" xmlns:p="http://schemas.openxmlformats.org/presentationml/2006/main" show="0">
   <p:cSld>
     <p:spTree>

</xml_diff>

<commit_message>
Changing docker -v to --mount
</commit_message>
<xml_diff>
--- a/docker/02_Docker_Fundamentals.pptx
+++ b/docker/02_Docker_Fundamentals.pptx
@@ -2,45 +2,45 @@
 <file path=ppt/presentation.xml><?xml version="1.0" encoding="utf-8"?>
 <p:presentation xmlns:a="http://schemas.openxmlformats.org/drawingml/2006/main" xmlns:r="http://schemas.openxmlformats.org/officeDocument/2006/relationships" xmlns:p="http://schemas.openxmlformats.org/presentationml/2006/main" saveSubsetFonts="1" autoCompressPictures="0">
   <p:sldMasterIdLst>
-    <p:sldMasterId id="2147483733" r:id="rId1"/>
+    <p:sldMasterId id="2147483733" r:id="rId4"/>
   </p:sldMasterIdLst>
   <p:notesMasterIdLst>
-    <p:notesMasterId r:id="rId32"/>
+    <p:notesMasterId r:id="rId35"/>
   </p:notesMasterIdLst>
   <p:handoutMasterIdLst>
-    <p:handoutMasterId r:id="rId33"/>
+    <p:handoutMasterId r:id="rId36"/>
   </p:handoutMasterIdLst>
   <p:sldIdLst>
-    <p:sldId id="454" r:id="rId2"/>
-    <p:sldId id="437" r:id="rId3"/>
-    <p:sldId id="453" r:id="rId4"/>
-    <p:sldId id="438" r:id="rId5"/>
-    <p:sldId id="382" r:id="rId6"/>
-    <p:sldId id="440" r:id="rId7"/>
-    <p:sldId id="457" r:id="rId8"/>
-    <p:sldId id="513" r:id="rId9"/>
-    <p:sldId id="434" r:id="rId10"/>
-    <p:sldId id="458" r:id="rId11"/>
-    <p:sldId id="463" r:id="rId12"/>
-    <p:sldId id="451" r:id="rId13"/>
-    <p:sldId id="462" r:id="rId14"/>
-    <p:sldId id="450" r:id="rId15"/>
-    <p:sldId id="441" r:id="rId16"/>
-    <p:sldId id="443" r:id="rId17"/>
-    <p:sldId id="445" r:id="rId18"/>
-    <p:sldId id="449" r:id="rId19"/>
-    <p:sldId id="459" r:id="rId20"/>
-    <p:sldId id="446" r:id="rId21"/>
-    <p:sldId id="470" r:id="rId22"/>
-    <p:sldId id="447" r:id="rId23"/>
-    <p:sldId id="465" r:id="rId24"/>
-    <p:sldId id="471" r:id="rId25"/>
-    <p:sldId id="472" r:id="rId26"/>
-    <p:sldId id="514" r:id="rId27"/>
-    <p:sldId id="467" r:id="rId28"/>
-    <p:sldId id="468" r:id="rId29"/>
-    <p:sldId id="469" r:id="rId30"/>
-    <p:sldId id="265" r:id="rId31"/>
+    <p:sldId id="454" r:id="rId5"/>
+    <p:sldId id="437" r:id="rId6"/>
+    <p:sldId id="453" r:id="rId7"/>
+    <p:sldId id="438" r:id="rId8"/>
+    <p:sldId id="382" r:id="rId9"/>
+    <p:sldId id="440" r:id="rId10"/>
+    <p:sldId id="457" r:id="rId11"/>
+    <p:sldId id="513" r:id="rId12"/>
+    <p:sldId id="434" r:id="rId13"/>
+    <p:sldId id="458" r:id="rId14"/>
+    <p:sldId id="463" r:id="rId15"/>
+    <p:sldId id="451" r:id="rId16"/>
+    <p:sldId id="462" r:id="rId17"/>
+    <p:sldId id="450" r:id="rId18"/>
+    <p:sldId id="441" r:id="rId19"/>
+    <p:sldId id="443" r:id="rId20"/>
+    <p:sldId id="445" r:id="rId21"/>
+    <p:sldId id="449" r:id="rId22"/>
+    <p:sldId id="459" r:id="rId23"/>
+    <p:sldId id="446" r:id="rId24"/>
+    <p:sldId id="470" r:id="rId25"/>
+    <p:sldId id="447" r:id="rId26"/>
+    <p:sldId id="465" r:id="rId27"/>
+    <p:sldId id="471" r:id="rId28"/>
+    <p:sldId id="472" r:id="rId29"/>
+    <p:sldId id="514" r:id="rId30"/>
+    <p:sldId id="467" r:id="rId31"/>
+    <p:sldId id="468" r:id="rId32"/>
+    <p:sldId id="469" r:id="rId33"/>
+    <p:sldId id="265" r:id="rId34"/>
   </p:sldIdLst>
   <p:sldSz cx="12195175" cy="6858000"/>
   <p:notesSz cx="6858000" cy="9144000"/>
@@ -3118,7 +3118,27 @@
                 <a:latin typeface="Courier New" panose="02070309020205020404" pitchFamily="49" charset="0"/>
                 <a:cs typeface="Courier New" panose="02070309020205020404" pitchFamily="49" charset="0"/>
               </a:rPr>
-              <a:t> docker run –v &lt;source path&gt;:&lt;container path&gt; …</a:t>
+              <a:t> docker run --mount type=</a:t>
+            </a:r>
+            <a:r>
+              <a:rPr lang="en-US" sz="1400" b="0" dirty="0" err="1">
+                <a:highlight>
+                  <a:srgbClr val="C0C0C0"/>
+                </a:highlight>
+                <a:latin typeface="Courier New" panose="02070309020205020404" pitchFamily="49" charset="0"/>
+                <a:cs typeface="Courier New" panose="02070309020205020404" pitchFamily="49" charset="0"/>
+              </a:rPr>
+              <a:t>bind,source</a:t>
+            </a:r>
+            <a:r>
+              <a:rPr lang="en-US" sz="1400" b="0" dirty="0">
+                <a:highlight>
+                  <a:srgbClr val="C0C0C0"/>
+                </a:highlight>
+                <a:latin typeface="Courier New" panose="02070309020205020404" pitchFamily="49" charset="0"/>
+                <a:cs typeface="Courier New" panose="02070309020205020404" pitchFamily="49" charset="0"/>
+              </a:rPr>
+              <a:t>=&lt;source path&gt;,target=&lt;container path&gt; …</a:t>
             </a:r>
           </a:p>
           <a:p>
@@ -3180,7 +3200,7 @@
                 <a:latin typeface="Courier New" panose="02070309020205020404" pitchFamily="49" charset="0"/>
                 <a:cs typeface="Courier New" panose="02070309020205020404" pitchFamily="49" charset="0"/>
               </a:rPr>
-              <a:t>docker run –v &lt;vol name&gt;:&lt;container path&gt; …</a:t>
+              <a:t>docker run --mount source=&lt;vol name&gt;,target=&lt;container path&gt; …</a:t>
             </a:r>
           </a:p>
           <a:p>
@@ -3406,7 +3426,23 @@
             </a:pPr>
             <a:r>
               <a:rPr lang="en-US" b="0" dirty="0"/>
-              <a:t>docker run -it -v /home/vagrant:/</a:t>
+              <a:t>docker run -it –mount type=</a:t>
+            </a:r>
+            <a:r>
+              <a:rPr lang="en-US" b="0" dirty="0" err="1"/>
+              <a:t>bind,source</a:t>
+            </a:r>
+            <a:r>
+              <a:rPr lang="en-US" b="0" dirty="0"/>
+              <a:t>=/home/</a:t>
+            </a:r>
+            <a:r>
+              <a:rPr lang="en-US" b="0" dirty="0" err="1"/>
+              <a:t>vagrant,target</a:t>
+            </a:r>
+            <a:r>
+              <a:rPr lang="en-US" b="0" dirty="0"/>
+              <a:t>=/</a:t>
             </a:r>
             <a:r>
               <a:rPr lang="en-US" b="0" dirty="0" err="1"/>
@@ -3459,7 +3495,23 @@
             </a:pPr>
             <a:r>
               <a:rPr lang="en-US" b="0" dirty="0"/>
-              <a:t>Docker run -it -v /home/vagrant:/</a:t>
+              <a:t>Docker run -it --mount type=</a:t>
+            </a:r>
+            <a:r>
+              <a:rPr lang="en-US" b="0" dirty="0" err="1"/>
+              <a:t>bind,source</a:t>
+            </a:r>
+            <a:r>
+              <a:rPr lang="en-US" b="0" dirty="0"/>
+              <a:t>=/home/</a:t>
+            </a:r>
+            <a:r>
+              <a:rPr lang="en-US" b="0" dirty="0" err="1"/>
+              <a:t>vagrant,target</a:t>
+            </a:r>
+            <a:r>
+              <a:rPr lang="en-US" b="0" dirty="0"/>
+              <a:t>=/</a:t>
             </a:r>
             <a:r>
               <a:rPr lang="en-US" b="0" dirty="0" err="1"/>
@@ -3545,23 +3597,15 @@
             </a:pPr>
             <a:r>
               <a:rPr lang="en-US" b="0" dirty="0"/>
-              <a:t>docker run -d -P -v </a:t>
+              <a:t>docker run -d -P --mount source=</a:t>
             </a:r>
             <a:r>
               <a:rPr lang="en-US" b="0" dirty="0" err="1"/>
-              <a:t>jenkins_home</a:t>
+              <a:t>jenkins_home,target</a:t>
             </a:r>
             <a:r>
               <a:rPr lang="en-US" b="0" dirty="0"/>
-              <a:t>:/</a:t>
-            </a:r>
-            <a:r>
-              <a:rPr lang="en-US" b="0" dirty="0" err="1"/>
-              <a:t>var</a:t>
-            </a:r>
-            <a:r>
-              <a:rPr lang="en-US" b="0" dirty="0"/>
-              <a:t>/</a:t>
+              <a:t>=/var/</a:t>
             </a:r>
             <a:r>
               <a:rPr lang="en-US" b="0" dirty="0" err="1"/>
@@ -43912,4 +43956,225 @@
   <a:objectDefaults/>
   <a:extraClrSchemeLst/>
 </a:theme>
+</file>
+
+<file path=customXml/item1.xml><?xml version="1.0" encoding="utf-8"?>
+<ct:contentTypeSchema xmlns:ct="http://schemas.microsoft.com/office/2006/metadata/contentType" xmlns:ma="http://schemas.microsoft.com/office/2006/metadata/properties/metaAttributes" ct:_="" ma:_="" ma:contentTypeName="Document" ma:contentTypeID="0x010100413C8A4F00697141B6FA960F762861E8" ma:contentTypeVersion="7" ma:contentTypeDescription="Create a new document." ma:contentTypeScope="" ma:versionID="75679eb20af3838b1eab1fbe72fef032">
+  <xsd:schema xmlns:xsd="http://www.w3.org/2001/XMLSchema" xmlns:xs="http://www.w3.org/2001/XMLSchema" xmlns:p="http://schemas.microsoft.com/office/2006/metadata/properties" xmlns:ns3="49a59b68-094c-48f7-af2b-0072ac24b77e" targetNamespace="http://schemas.microsoft.com/office/2006/metadata/properties" ma:root="true" ma:fieldsID="223f61b356e47f140bcb594d278c0c55" ns3:_="">
+    <xsd:import namespace="49a59b68-094c-48f7-af2b-0072ac24b77e"/>
+    <xsd:element name="properties">
+      <xsd:complexType>
+        <xsd:sequence>
+          <xsd:element name="documentManagement">
+            <xsd:complexType>
+              <xsd:all>
+                <xsd:element ref="ns3:MediaServiceMetadata" minOccurs="0"/>
+                <xsd:element ref="ns3:MediaServiceFastMetadata" minOccurs="0"/>
+                <xsd:element ref="ns3:MediaServiceDateTaken" minOccurs="0"/>
+                <xsd:element ref="ns3:MediaServiceAutoTags" minOccurs="0"/>
+                <xsd:element ref="ns3:MediaServiceOCR" minOccurs="0"/>
+                <xsd:element ref="ns3:MediaServiceGenerationTime" minOccurs="0"/>
+                <xsd:element ref="ns3:MediaServiceEventHashCode" minOccurs="0"/>
+              </xsd:all>
+            </xsd:complexType>
+          </xsd:element>
+        </xsd:sequence>
+      </xsd:complexType>
+    </xsd:element>
+  </xsd:schema>
+  <xsd:schema xmlns:xsd="http://www.w3.org/2001/XMLSchema" xmlns:xs="http://www.w3.org/2001/XMLSchema" xmlns:dms="http://schemas.microsoft.com/office/2006/documentManagement/types" xmlns:pc="http://schemas.microsoft.com/office/infopath/2007/PartnerControls" targetNamespace="49a59b68-094c-48f7-af2b-0072ac24b77e" elementFormDefault="qualified">
+    <xsd:import namespace="http://schemas.microsoft.com/office/2006/documentManagement/types"/>
+    <xsd:import namespace="http://schemas.microsoft.com/office/infopath/2007/PartnerControls"/>
+    <xsd:element name="MediaServiceMetadata" ma:index="8" nillable="true" ma:displayName="MediaServiceMetadata" ma:hidden="true" ma:internalName="MediaServiceMetadata" ma:readOnly="true">
+      <xsd:simpleType>
+        <xsd:restriction base="dms:Note"/>
+      </xsd:simpleType>
+    </xsd:element>
+    <xsd:element name="MediaServiceFastMetadata" ma:index="9" nillable="true" ma:displayName="MediaServiceFastMetadata" ma:hidden="true" ma:internalName="MediaServiceFastMetadata" ma:readOnly="true">
+      <xsd:simpleType>
+        <xsd:restriction base="dms:Note"/>
+      </xsd:simpleType>
+    </xsd:element>
+    <xsd:element name="MediaServiceDateTaken" ma:index="10" nillable="true" ma:displayName="MediaServiceDateTaken" ma:hidden="true" ma:internalName="MediaServiceDateTaken" ma:readOnly="true">
+      <xsd:simpleType>
+        <xsd:restriction base="dms:Text"/>
+      </xsd:simpleType>
+    </xsd:element>
+    <xsd:element name="MediaServiceAutoTags" ma:index="11" nillable="true" ma:displayName="Tags" ma:internalName="MediaServiceAutoTags" ma:readOnly="true">
+      <xsd:simpleType>
+        <xsd:restriction base="dms:Text"/>
+      </xsd:simpleType>
+    </xsd:element>
+    <xsd:element name="MediaServiceOCR" ma:index="12" nillable="true" ma:displayName="Extracted Text" ma:internalName="MediaServiceOCR" ma:readOnly="true">
+      <xsd:simpleType>
+        <xsd:restriction base="dms:Note">
+          <xsd:maxLength value="255"/>
+        </xsd:restriction>
+      </xsd:simpleType>
+    </xsd:element>
+    <xsd:element name="MediaServiceGenerationTime" ma:index="13" nillable="true" ma:displayName="MediaServiceGenerationTime" ma:hidden="true" ma:internalName="MediaServiceGenerationTime" ma:readOnly="true">
+      <xsd:simpleType>
+        <xsd:restriction base="dms:Text"/>
+      </xsd:simpleType>
+    </xsd:element>
+    <xsd:element name="MediaServiceEventHashCode" ma:index="14" nillable="true" ma:displayName="MediaServiceEventHashCode" ma:hidden="true" ma:internalName="MediaServiceEventHashCode" ma:readOnly="true">
+      <xsd:simpleType>
+        <xsd:restriction base="dms:Text"/>
+      </xsd:simpleType>
+    </xsd:element>
+  </xsd:schema>
+  <xsd:schema xmlns="http://schemas.openxmlformats.org/package/2006/metadata/core-properties" xmlns:xsd="http://www.w3.org/2001/XMLSchema" xmlns:xsi="http://www.w3.org/2001/XMLSchema-instance" xmlns:dc="http://purl.org/dc/elements/1.1/" xmlns:dcterms="http://purl.org/dc/terms/" xmlns:odoc="http://schemas.microsoft.com/internal/obd" targetNamespace="http://schemas.openxmlformats.org/package/2006/metadata/core-properties" elementFormDefault="qualified" attributeFormDefault="unqualified" blockDefault="#all">
+    <xsd:import namespace="http://purl.org/dc/elements/1.1/" schemaLocation="http://dublincore.org/schemas/xmls/qdc/2003/04/02/dc.xsd"/>
+    <xsd:import namespace="http://purl.org/dc/terms/" schemaLocation="http://dublincore.org/schemas/xmls/qdc/2003/04/02/dcterms.xsd"/>
+    <xsd:element name="coreProperties" type="CT_coreProperties"/>
+    <xsd:complexType name="CT_coreProperties">
+      <xsd:all>
+        <xsd:element ref="dc:creator" minOccurs="0" maxOccurs="1"/>
+        <xsd:element ref="dcterms:created" minOccurs="0" maxOccurs="1"/>
+        <xsd:element ref="dc:identifier" minOccurs="0" maxOccurs="1"/>
+        <xsd:element name="contentType" minOccurs="0" maxOccurs="1" type="xsd:string" ma:index="0" ma:displayName="Content Type"/>
+        <xsd:element ref="dc:title" minOccurs="0" maxOccurs="1" ma:index="4" ma:displayName="Title"/>
+        <xsd:element ref="dc:subject" minOccurs="0" maxOccurs="1"/>
+        <xsd:element ref="dc:description" minOccurs="0" maxOccurs="1"/>
+        <xsd:element name="keywords" minOccurs="0" maxOccurs="1" type="xsd:string"/>
+        <xsd:element ref="dc:language" minOccurs="0" maxOccurs="1"/>
+        <xsd:element name="category" minOccurs="0" maxOccurs="1" type="xsd:string"/>
+        <xsd:element name="version" minOccurs="0" maxOccurs="1" type="xsd:string"/>
+        <xsd:element name="revision" minOccurs="0" maxOccurs="1" type="xsd:string">
+          <xsd:annotation>
+            <xsd:documentation>
+                        This value indicates the number of saves or revisions. The application is responsible for updating this value after each revision.
+                    </xsd:documentation>
+          </xsd:annotation>
+        </xsd:element>
+        <xsd:element name="lastModifiedBy" minOccurs="0" maxOccurs="1" type="xsd:string"/>
+        <xsd:element ref="dcterms:modified" minOccurs="0" maxOccurs="1"/>
+        <xsd:element name="contentStatus" minOccurs="0" maxOccurs="1" type="xsd:string"/>
+      </xsd:all>
+    </xsd:complexType>
+  </xsd:schema>
+  <xs:schema xmlns:pc="http://schemas.microsoft.com/office/infopath/2007/PartnerControls" xmlns:xs="http://www.w3.org/2001/XMLSchema" targetNamespace="http://schemas.microsoft.com/office/infopath/2007/PartnerControls" elementFormDefault="qualified" attributeFormDefault="unqualified">
+    <xs:element name="Person">
+      <xs:complexType>
+        <xs:sequence>
+          <xs:element ref="pc:DisplayName" minOccurs="0"/>
+          <xs:element ref="pc:AccountId" minOccurs="0"/>
+          <xs:element ref="pc:AccountType" minOccurs="0"/>
+        </xs:sequence>
+      </xs:complexType>
+    </xs:element>
+    <xs:element name="DisplayName" type="xs:string"/>
+    <xs:element name="AccountId" type="xs:string"/>
+    <xs:element name="AccountType" type="xs:string"/>
+    <xs:element name="BDCAssociatedEntity">
+      <xs:complexType>
+        <xs:sequence>
+          <xs:element ref="pc:BDCEntity" minOccurs="0" maxOccurs="unbounded"/>
+        </xs:sequence>
+        <xs:attribute ref="pc:EntityNamespace"/>
+        <xs:attribute ref="pc:EntityName"/>
+        <xs:attribute ref="pc:SystemInstanceName"/>
+        <xs:attribute ref="pc:AssociationName"/>
+      </xs:complexType>
+    </xs:element>
+    <xs:attribute name="EntityNamespace" type="xs:string"/>
+    <xs:attribute name="EntityName" type="xs:string"/>
+    <xs:attribute name="SystemInstanceName" type="xs:string"/>
+    <xs:attribute name="AssociationName" type="xs:string"/>
+    <xs:element name="BDCEntity">
+      <xs:complexType>
+        <xs:sequence>
+          <xs:element ref="pc:EntityDisplayName" minOccurs="0"/>
+          <xs:element ref="pc:EntityInstanceReference" minOccurs="0"/>
+          <xs:element ref="pc:EntityId1" minOccurs="0"/>
+          <xs:element ref="pc:EntityId2" minOccurs="0"/>
+          <xs:element ref="pc:EntityId3" minOccurs="0"/>
+          <xs:element ref="pc:EntityId4" minOccurs="0"/>
+          <xs:element ref="pc:EntityId5" minOccurs="0"/>
+        </xs:sequence>
+      </xs:complexType>
+    </xs:element>
+    <xs:element name="EntityDisplayName" type="xs:string"/>
+    <xs:element name="EntityInstanceReference" type="xs:string"/>
+    <xs:element name="EntityId1" type="xs:string"/>
+    <xs:element name="EntityId2" type="xs:string"/>
+    <xs:element name="EntityId3" type="xs:string"/>
+    <xs:element name="EntityId4" type="xs:string"/>
+    <xs:element name="EntityId5" type="xs:string"/>
+    <xs:element name="Terms">
+      <xs:complexType>
+        <xs:sequence>
+          <xs:element ref="pc:TermInfo" minOccurs="0" maxOccurs="unbounded"/>
+        </xs:sequence>
+      </xs:complexType>
+    </xs:element>
+    <xs:element name="TermInfo">
+      <xs:complexType>
+        <xs:sequence>
+          <xs:element ref="pc:TermName" minOccurs="0"/>
+          <xs:element ref="pc:TermId" minOccurs="0"/>
+        </xs:sequence>
+      </xs:complexType>
+    </xs:element>
+    <xs:element name="TermName" type="xs:string"/>
+    <xs:element name="TermId" type="xs:string"/>
+  </xs:schema>
+</ct:contentTypeSchema>
+</file>
+
+<file path=customXml/item2.xml><?xml version="1.0" encoding="utf-8"?>
+<?mso-contentType ?>
+<FormTemplates xmlns="http://schemas.microsoft.com/sharepoint/v3/contenttype/forms">
+  <Display>DocumentLibraryForm</Display>
+  <Edit>DocumentLibraryForm</Edit>
+  <New>DocumentLibraryForm</New>
+</FormTemplates>
+</file>
+
+<file path=customXml/item3.xml><?xml version="1.0" encoding="utf-8"?>
+<p:properties xmlns:p="http://schemas.microsoft.com/office/2006/metadata/properties" xmlns:xsi="http://www.w3.org/2001/XMLSchema-instance" xmlns:pc="http://schemas.microsoft.com/office/infopath/2007/PartnerControls">
+  <documentManagement/>
+</p:properties>
+</file>
+
+<file path=customXml/itemProps1.xml><?xml version="1.0" encoding="utf-8"?>
+<ds:datastoreItem xmlns:ds="http://schemas.openxmlformats.org/officeDocument/2006/customXml" ds:itemID="{9234AC07-8006-4F61-93F8-4AB6A04320B1}">
+  <ds:schemaRefs>
+    <ds:schemaRef ds:uri="http://schemas.microsoft.com/office/2006/metadata/contentType"/>
+    <ds:schemaRef ds:uri="http://schemas.microsoft.com/office/2006/metadata/properties/metaAttributes"/>
+    <ds:schemaRef ds:uri="http://www.w3.org/2001/XMLSchema"/>
+    <ds:schemaRef ds:uri="http://schemas.microsoft.com/office/2006/metadata/properties"/>
+    <ds:schemaRef ds:uri="49a59b68-094c-48f7-af2b-0072ac24b77e"/>
+    <ds:schemaRef ds:uri="http://schemas.microsoft.com/office/2006/documentManagement/types"/>
+    <ds:schemaRef ds:uri="http://schemas.microsoft.com/office/infopath/2007/PartnerControls"/>
+    <ds:schemaRef ds:uri="http://schemas.openxmlformats.org/package/2006/metadata/core-properties"/>
+    <ds:schemaRef ds:uri="http://purl.org/dc/elements/1.1/"/>
+    <ds:schemaRef ds:uri="http://purl.org/dc/terms/"/>
+    <ds:schemaRef ds:uri="http://schemas.microsoft.com/internal/obd"/>
+  </ds:schemaRefs>
+</ds:datastoreItem>
+</file>
+
+<file path=customXml/itemProps2.xml><?xml version="1.0" encoding="utf-8"?>
+<ds:datastoreItem xmlns:ds="http://schemas.openxmlformats.org/officeDocument/2006/customXml" ds:itemID="{C2223F73-0F08-4D22-88C9-602F4313BC72}">
+  <ds:schemaRefs>
+    <ds:schemaRef ds:uri="http://schemas.microsoft.com/sharepoint/v3/contenttype/forms"/>
+  </ds:schemaRefs>
+</ds:datastoreItem>
+</file>
+
+<file path=customXml/itemProps3.xml><?xml version="1.0" encoding="utf-8"?>
+<ds:datastoreItem xmlns:ds="http://schemas.openxmlformats.org/officeDocument/2006/customXml" ds:itemID="{EE15B31B-466C-488E-B171-800C9BAA728E}">
+  <ds:schemaRefs>
+    <ds:schemaRef ds:uri="http://schemas.openxmlformats.org/package/2006/metadata/core-properties"/>
+    <ds:schemaRef ds:uri="http://purl.org/dc/elements/1.1/"/>
+    <ds:schemaRef ds:uri="http://purl.org/dc/terms/"/>
+    <ds:schemaRef ds:uri="http://schemas.microsoft.com/office/2006/metadata/properties"/>
+    <ds:schemaRef ds:uri="http://purl.org/dc/dcmitype/"/>
+    <ds:schemaRef ds:uri="http://schemas.microsoft.com/office/2006/documentManagement/types"/>
+    <ds:schemaRef ds:uri="http://schemas.microsoft.com/office/infopath/2007/PartnerControls"/>
+    <ds:schemaRef ds:uri="49a59b68-094c-48f7-af2b-0072ac24b77e"/>
+    <ds:schemaRef ds:uri="http://www.w3.org/XML/1998/namespace"/>
+  </ds:schemaRefs>
+</ds:datastoreItem>
 </file>
</xml_diff>